<commit_message>
Gametime 180sek / Präsi Teil Villiger
</commit_message>
<xml_diff>
--- a/Docs/RocketShooter.pptx
+++ b/Docs/RocketShooter.pptx
@@ -5,10 +5,10 @@
     <p:sldMasterId id="2147483669" r:id="rId4"/>
   </p:sldMasterIdLst>
   <p:notesMasterIdLst>
-    <p:notesMasterId r:id="rId15"/>
+    <p:notesMasterId r:id="rId17"/>
   </p:notesMasterIdLst>
   <p:handoutMasterIdLst>
-    <p:handoutMasterId r:id="rId16"/>
+    <p:handoutMasterId r:id="rId18"/>
   </p:handoutMasterIdLst>
   <p:sldIdLst>
     <p:sldId id="256" r:id="rId5"/>
@@ -19,8 +19,10 @@
     <p:sldId id="261" r:id="rId10"/>
     <p:sldId id="265" r:id="rId11"/>
     <p:sldId id="262" r:id="rId12"/>
-    <p:sldId id="263" r:id="rId13"/>
-    <p:sldId id="264" r:id="rId14"/>
+    <p:sldId id="266" r:id="rId13"/>
+    <p:sldId id="267" r:id="rId14"/>
+    <p:sldId id="263" r:id="rId15"/>
+    <p:sldId id="264" r:id="rId16"/>
   </p:sldIdLst>
   <p:sldSz cx="9144000" cy="6858000" type="screen4x3"/>
   <p:notesSz cx="6797675" cy="9872663"/>
@@ -151,7 +153,7 @@
   </p:defaultTextStyle>
   <p:extLst>
     <p:ext uri="{EFAFB233-063F-42B5-8137-9DF3F51BA10A}">
-      <p15:sldGuideLst xmlns="" xmlns:p15="http://schemas.microsoft.com/office/powerpoint/2012/main">
+      <p15:sldGuideLst xmlns:p15="http://schemas.microsoft.com/office/powerpoint/2012/main">
         <p15:guide id="1" orient="horz" pos="2160">
           <p15:clr>
             <a:srgbClr val="A4A3A4"/>
@@ -165,7 +167,7 @@
       </p15:sldGuideLst>
     </p:ext>
     <p:ext uri="{2D200454-40CA-4A62-9FC3-DE9A4176ACB9}">
-      <p15:notesGuideLst xmlns="" xmlns:p15="http://schemas.microsoft.com/office/powerpoint/2012/main">
+      <p15:notesGuideLst xmlns:p15="http://schemas.microsoft.com/office/powerpoint/2012/main">
         <p15:guide id="1" orient="horz" pos="3110">
           <p15:clr>
             <a:srgbClr val="A4A3A4"/>
@@ -772,6 +774,246 @@
     <p:extLst>
       <p:ext uri="{BB962C8B-B14F-4D97-AF65-F5344CB8AC3E}">
         <p14:creationId xmlns:p14="http://schemas.microsoft.com/office/powerpoint/2010/main" val="2027060611"/>
+      </p:ext>
+    </p:extLst>
+  </p:cSld>
+  <p:clrMapOvr>
+    <a:masterClrMapping/>
+  </p:clrMapOvr>
+</p:notes>
+</file>
+
+<file path=ppt/notesSlides/notesSlide2.xml><?xml version="1.0" encoding="utf-8"?>
+<p:notes xmlns:a="http://schemas.openxmlformats.org/drawingml/2006/main" xmlns:r="http://schemas.openxmlformats.org/officeDocument/2006/relationships" xmlns:p="http://schemas.openxmlformats.org/presentationml/2006/main">
+  <p:cSld>
+    <p:spTree>
+      <p:nvGrpSpPr>
+        <p:cNvPr id="1" name=""/>
+        <p:cNvGrpSpPr/>
+        <p:nvPr/>
+      </p:nvGrpSpPr>
+      <p:grpSpPr>
+        <a:xfrm>
+          <a:off x="0" y="0"/>
+          <a:ext cx="0" cy="0"/>
+          <a:chOff x="0" y="0"/>
+          <a:chExt cx="0" cy="0"/>
+        </a:xfrm>
+      </p:grpSpPr>
+      <p:sp>
+        <p:nvSpPr>
+          <p:cNvPr id="2" name="Folienbildplatzhalter 1"/>
+          <p:cNvSpPr>
+            <a:spLocks noGrp="1" noRot="1" noChangeAspect="1"/>
+          </p:cNvSpPr>
+          <p:nvPr>
+            <p:ph type="sldImg"/>
+          </p:nvPr>
+        </p:nvSpPr>
+        <p:spPr/>
+      </p:sp>
+      <p:sp>
+        <p:nvSpPr>
+          <p:cNvPr id="3" name="Notizenplatzhalter 2"/>
+          <p:cNvSpPr>
+            <a:spLocks noGrp="1"/>
+          </p:cNvSpPr>
+          <p:nvPr>
+            <p:ph type="body" idx="1"/>
+          </p:nvPr>
+        </p:nvSpPr>
+        <p:spPr/>
+        <p:txBody>
+          <a:bodyPr/>
+          <a:lstStyle/>
+          <a:p>
+            <a:r>
+              <a:rPr lang="de-CH" b="1" dirty="0" err="1" smtClean="0"/>
+              <a:t>ExplosionForce</a:t>
+            </a:r>
+            <a:endParaRPr lang="de-CH" b="1" dirty="0" smtClean="0"/>
+          </a:p>
+          <a:p>
+            <a:pPr marL="171450" indent="-171450">
+              <a:buFontTx/>
+              <a:buChar char="-"/>
+            </a:pPr>
+            <a:r>
+              <a:rPr lang="de-CH" dirty="0" smtClean="0"/>
+              <a:t>Check</a:t>
+            </a:r>
+            <a:r>
+              <a:rPr lang="de-CH" baseline="0" dirty="0" smtClean="0"/>
+              <a:t> mittels </a:t>
+            </a:r>
+            <a:r>
+              <a:rPr lang="de-CH" baseline="0" dirty="0" err="1" smtClean="0"/>
+              <a:t>Overlap</a:t>
+            </a:r>
+            <a:r>
+              <a:rPr lang="de-CH" baseline="0" dirty="0" smtClean="0"/>
+              <a:t> </a:t>
+            </a:r>
+            <a:r>
+              <a:rPr lang="de-CH" baseline="0" dirty="0" err="1" smtClean="0"/>
+              <a:t>Sphere</a:t>
+            </a:r>
+            <a:endParaRPr lang="de-CH" baseline="0" dirty="0" smtClean="0"/>
+          </a:p>
+          <a:p>
+            <a:pPr marL="171450" indent="-171450">
+              <a:buFontTx/>
+              <a:buChar char="-"/>
+            </a:pPr>
+            <a:r>
+              <a:rPr lang="de-CH" baseline="0" dirty="0" smtClean="0"/>
+              <a:t>Alle </a:t>
+            </a:r>
+            <a:r>
+              <a:rPr lang="de-CH" baseline="0" dirty="0" err="1" smtClean="0"/>
+              <a:t>Rigidbodies</a:t>
+            </a:r>
+            <a:r>
+              <a:rPr lang="de-CH" baseline="0" dirty="0" smtClean="0"/>
+              <a:t> in Liste schmeissen</a:t>
+            </a:r>
+          </a:p>
+          <a:p>
+            <a:pPr marL="171450" indent="-171450">
+              <a:buFontTx/>
+              <a:buChar char="-"/>
+            </a:pPr>
+            <a:r>
+              <a:rPr lang="de-CH" baseline="0" dirty="0" err="1" smtClean="0"/>
+              <a:t>AddExplosionForce</a:t>
+            </a:r>
+            <a:r>
+              <a:rPr lang="de-CH" baseline="0" dirty="0" smtClean="0"/>
+              <a:t> für alle Elemente in Liste. </a:t>
+            </a:r>
+            <a:r>
+              <a:rPr lang="de-CH" baseline="0" dirty="0" err="1" smtClean="0"/>
+              <a:t>Param</a:t>
+            </a:r>
+            <a:r>
+              <a:rPr lang="de-CH" baseline="0" dirty="0" smtClean="0"/>
+              <a:t>: Aktuelle Position Explosion </a:t>
+            </a:r>
+            <a:endParaRPr lang="en-US" dirty="0"/>
+          </a:p>
+        </p:txBody>
+      </p:sp>
+      <p:sp>
+        <p:nvSpPr>
+          <p:cNvPr id="4" name="Foliennummernplatzhalter 3"/>
+          <p:cNvSpPr>
+            <a:spLocks noGrp="1"/>
+          </p:cNvSpPr>
+          <p:nvPr>
+            <p:ph type="sldNum" sz="quarter" idx="10"/>
+          </p:nvPr>
+        </p:nvSpPr>
+        <p:spPr/>
+        <p:txBody>
+          <a:bodyPr/>
+          <a:lstStyle/>
+          <a:p>
+            <a:fld id="{37E44704-8E6D-4CF2-8CFA-A0F7BC751896}" type="slidenum">
+              <a:rPr lang="de-CH" smtClean="0"/>
+              <a:t>9</a:t>
+            </a:fld>
+            <a:endParaRPr lang="de-CH"/>
+          </a:p>
+        </p:txBody>
+      </p:sp>
+    </p:spTree>
+    <p:extLst>
+      <p:ext uri="{BB962C8B-B14F-4D97-AF65-F5344CB8AC3E}">
+        <p14:creationId xmlns:p14="http://schemas.microsoft.com/office/powerpoint/2010/main" val="494343081"/>
+      </p:ext>
+    </p:extLst>
+  </p:cSld>
+  <p:clrMapOvr>
+    <a:masterClrMapping/>
+  </p:clrMapOvr>
+</p:notes>
+</file>
+
+<file path=ppt/notesSlides/notesSlide3.xml><?xml version="1.0" encoding="utf-8"?>
+<p:notes xmlns:a="http://schemas.openxmlformats.org/drawingml/2006/main" xmlns:r="http://schemas.openxmlformats.org/officeDocument/2006/relationships" xmlns:p="http://schemas.openxmlformats.org/presentationml/2006/main">
+  <p:cSld>
+    <p:spTree>
+      <p:nvGrpSpPr>
+        <p:cNvPr id="1" name=""/>
+        <p:cNvGrpSpPr/>
+        <p:nvPr/>
+      </p:nvGrpSpPr>
+      <p:grpSpPr>
+        <a:xfrm>
+          <a:off x="0" y="0"/>
+          <a:ext cx="0" cy="0"/>
+          <a:chOff x="0" y="0"/>
+          <a:chExt cx="0" cy="0"/>
+        </a:xfrm>
+      </p:grpSpPr>
+      <p:sp>
+        <p:nvSpPr>
+          <p:cNvPr id="2" name="Folienbildplatzhalter 1"/>
+          <p:cNvSpPr>
+            <a:spLocks noGrp="1" noRot="1" noChangeAspect="1"/>
+          </p:cNvSpPr>
+          <p:nvPr>
+            <p:ph type="sldImg"/>
+          </p:nvPr>
+        </p:nvSpPr>
+        <p:spPr/>
+      </p:sp>
+      <p:sp>
+        <p:nvSpPr>
+          <p:cNvPr id="3" name="Notizenplatzhalter 2"/>
+          <p:cNvSpPr>
+            <a:spLocks noGrp="1"/>
+          </p:cNvSpPr>
+          <p:nvPr>
+            <p:ph type="body" idx="1"/>
+          </p:nvPr>
+        </p:nvSpPr>
+        <p:spPr/>
+        <p:txBody>
+          <a:bodyPr/>
+          <a:lstStyle/>
+          <a:p>
+            <a:endParaRPr lang="en-US" dirty="0"/>
+          </a:p>
+        </p:txBody>
+      </p:sp>
+      <p:sp>
+        <p:nvSpPr>
+          <p:cNvPr id="4" name="Foliennummernplatzhalter 3"/>
+          <p:cNvSpPr>
+            <a:spLocks noGrp="1"/>
+          </p:cNvSpPr>
+          <p:nvPr>
+            <p:ph type="sldNum" sz="quarter" idx="10"/>
+          </p:nvPr>
+        </p:nvSpPr>
+        <p:spPr/>
+        <p:txBody>
+          <a:bodyPr/>
+          <a:lstStyle/>
+          <a:p>
+            <a:fld id="{37E44704-8E6D-4CF2-8CFA-A0F7BC751896}" type="slidenum">
+              <a:rPr lang="de-CH" smtClean="0"/>
+              <a:t>10</a:t>
+            </a:fld>
+            <a:endParaRPr lang="de-CH"/>
+          </a:p>
+        </p:txBody>
+      </p:sp>
+    </p:spTree>
+    <p:extLst>
+      <p:ext uri="{BB962C8B-B14F-4D97-AF65-F5344CB8AC3E}">
+        <p14:creationId xmlns:p14="http://schemas.microsoft.com/office/powerpoint/2010/main" val="742454222"/>
       </p:ext>
     </p:extLst>
   </p:cSld>
@@ -6973,6 +7215,791 @@
           <a:p>
             <a:r>
               <a:rPr lang="de-CH" dirty="0" smtClean="0"/>
+              <a:t>Punkteberechnung nach Treffer</a:t>
+            </a:r>
+          </a:p>
+          <a:p>
+            <a:pPr marL="800100" lvl="1" indent="-342900">
+              <a:buFont typeface="+mj-lt"/>
+              <a:buAutoNum type="arabicPeriod"/>
+            </a:pPr>
+            <a:r>
+              <a:rPr lang="de-CH" dirty="0" err="1"/>
+              <a:t>Dictionary</a:t>
+            </a:r>
+            <a:r>
+              <a:rPr lang="de-CH" dirty="0"/>
+              <a:t> in Spiel-Hierarchie mit Punktestand von jedem Spieler</a:t>
+            </a:r>
+          </a:p>
+          <a:p>
+            <a:pPr marL="800100" lvl="1" indent="-342900">
+              <a:buFont typeface="+mj-lt"/>
+              <a:buAutoNum type="arabicPeriod"/>
+            </a:pPr>
+            <a:r>
+              <a:rPr lang="de-CH" dirty="0" smtClean="0"/>
+              <a:t>Lineare Funktion für Punkteberechnung je nach Distanz zu Auto</a:t>
+            </a:r>
+          </a:p>
+          <a:p>
+            <a:pPr marL="800100" lvl="1" indent="-342900">
+              <a:buFont typeface="+mj-lt"/>
+              <a:buAutoNum type="arabicPeriod"/>
+            </a:pPr>
+            <a:r>
+              <a:rPr lang="de-CH" dirty="0" smtClean="0"/>
+              <a:t>Erspielte Punkte per RPC übermitteln</a:t>
+            </a:r>
+          </a:p>
+          <a:p>
+            <a:pPr marL="800100" lvl="1" indent="-342900">
+              <a:buFont typeface="+mj-lt"/>
+              <a:buAutoNum type="arabicPeriod"/>
+            </a:pPr>
+            <a:r>
+              <a:rPr lang="de-CH" dirty="0" err="1" smtClean="0"/>
+              <a:t>Dictionary</a:t>
+            </a:r>
+            <a:r>
+              <a:rPr lang="de-CH" dirty="0" smtClean="0"/>
+              <a:t> Updaten und anzeigen</a:t>
+            </a:r>
+          </a:p>
+          <a:p>
+            <a:pPr marL="800100" lvl="1" indent="-342900">
+              <a:buFont typeface="+mj-lt"/>
+              <a:buAutoNum type="arabicPeriod"/>
+            </a:pPr>
+            <a:endParaRPr lang="de-CH" dirty="0"/>
+          </a:p>
+          <a:p>
+            <a:pPr marL="328613" indent="-342900"/>
+            <a:r>
+              <a:rPr lang="de-CH" dirty="0" smtClean="0"/>
+              <a:t>Bei Spielende Gewinner ermitteln und Rang anzeigen</a:t>
+            </a:r>
+          </a:p>
+          <a:p>
+            <a:pPr marL="800100" lvl="1" indent="-342900"/>
+            <a:r>
+              <a:rPr lang="de-CH" dirty="0" smtClean="0"/>
+              <a:t>Zentral geführter Counter</a:t>
+            </a:r>
+          </a:p>
+        </p:txBody>
+      </p:sp>
+      <p:sp>
+        <p:nvSpPr>
+          <p:cNvPr id="3" name="Titel 2"/>
+          <p:cNvSpPr>
+            <a:spLocks noGrp="1"/>
+          </p:cNvSpPr>
+          <p:nvPr>
+            <p:ph type="ctrTitle"/>
+          </p:nvPr>
+        </p:nvSpPr>
+        <p:spPr/>
+        <p:txBody>
+          <a:bodyPr/>
+          <a:lstStyle/>
+          <a:p>
+            <a:r>
+              <a:rPr lang="de-CH" dirty="0" err="1" smtClean="0"/>
+              <a:t>Rockets</a:t>
+            </a:r>
+            <a:endParaRPr lang="en-US" dirty="0"/>
+          </a:p>
+        </p:txBody>
+      </p:sp>
+    </p:spTree>
+    <p:extLst>
+      <p:ext uri="{BB962C8B-B14F-4D97-AF65-F5344CB8AC3E}">
+        <p14:creationId xmlns:p14="http://schemas.microsoft.com/office/powerpoint/2010/main" val="375134555"/>
+      </p:ext>
+    </p:extLst>
+  </p:cSld>
+  <p:clrMapOvr>
+    <a:masterClrMapping/>
+  </p:clrMapOvr>
+  <mc:AlternateContent xmlns:mc="http://schemas.openxmlformats.org/markup-compatibility/2006">
+    <mc:Choice xmlns:p14="http://schemas.microsoft.com/office/powerpoint/2010/main" Requires="p14">
+      <p:transition p14:dur="0"/>
+    </mc:Choice>
+    <mc:Fallback>
+      <p:transition/>
+    </mc:Fallback>
+  </mc:AlternateContent>
+  <p:timing>
+    <p:tnLst>
+      <p:par>
+        <p:cTn id="1" dur="indefinite" restart="never" nodeType="tmRoot">
+          <p:childTnLst>
+            <p:seq concurrent="1" nextAc="seek">
+              <p:cTn id="2" dur="indefinite" nodeType="mainSeq">
+                <p:childTnLst>
+                  <p:par>
+                    <p:cTn id="3" fill="hold">
+                      <p:stCondLst>
+                        <p:cond delay="indefinite"/>
+                        <p:cond evt="onBegin" delay="0">
+                          <p:tn val="2"/>
+                        </p:cond>
+                      </p:stCondLst>
+                      <p:childTnLst>
+                        <p:par>
+                          <p:cTn id="4" fill="hold">
+                            <p:stCondLst>
+                              <p:cond delay="0"/>
+                            </p:stCondLst>
+                            <p:childTnLst>
+                              <p:par>
+                                <p:cTn id="5" presetID="1" presetClass="entr" presetSubtype="0" fill="hold" grpId="0" nodeType="withEffect">
+                                  <p:stCondLst>
+                                    <p:cond delay="0"/>
+                                  </p:stCondLst>
+                                  <p:childTnLst>
+                                    <p:set>
+                                      <p:cBhvr>
+                                        <p:cTn id="6" dur="1" fill="hold">
+                                          <p:stCondLst>
+                                            <p:cond delay="0"/>
+                                          </p:stCondLst>
+                                        </p:cTn>
+                                        <p:tgtEl>
+                                          <p:spTgt spid="2">
+                                            <p:txEl>
+                                              <p:pRg st="0" end="0"/>
+                                            </p:txEl>
+                                          </p:spTgt>
+                                        </p:tgtEl>
+                                        <p:attrNameLst>
+                                          <p:attrName>style.visibility</p:attrName>
+                                        </p:attrNameLst>
+                                      </p:cBhvr>
+                                      <p:to>
+                                        <p:strVal val="visible"/>
+                                      </p:to>
+                                    </p:set>
+                                  </p:childTnLst>
+                                </p:cTn>
+                              </p:par>
+                            </p:childTnLst>
+                          </p:cTn>
+                        </p:par>
+                      </p:childTnLst>
+                    </p:cTn>
+                  </p:par>
+                  <p:par>
+                    <p:cTn id="7" fill="hold">
+                      <p:stCondLst>
+                        <p:cond delay="indefinite"/>
+                      </p:stCondLst>
+                      <p:childTnLst>
+                        <p:par>
+                          <p:cTn id="8" fill="hold">
+                            <p:stCondLst>
+                              <p:cond delay="0"/>
+                            </p:stCondLst>
+                            <p:childTnLst>
+                              <p:par>
+                                <p:cTn id="9" presetID="1" presetClass="entr" presetSubtype="0" fill="hold" grpId="0" nodeType="clickEffect">
+                                  <p:stCondLst>
+                                    <p:cond delay="0"/>
+                                  </p:stCondLst>
+                                  <p:childTnLst>
+                                    <p:set>
+                                      <p:cBhvr>
+                                        <p:cTn id="10" dur="1" fill="hold">
+                                          <p:stCondLst>
+                                            <p:cond delay="0"/>
+                                          </p:stCondLst>
+                                        </p:cTn>
+                                        <p:tgtEl>
+                                          <p:spTgt spid="2">
+                                            <p:txEl>
+                                              <p:pRg st="1" end="1"/>
+                                            </p:txEl>
+                                          </p:spTgt>
+                                        </p:tgtEl>
+                                        <p:attrNameLst>
+                                          <p:attrName>style.visibility</p:attrName>
+                                        </p:attrNameLst>
+                                      </p:cBhvr>
+                                      <p:to>
+                                        <p:strVal val="visible"/>
+                                      </p:to>
+                                    </p:set>
+                                  </p:childTnLst>
+                                </p:cTn>
+                              </p:par>
+                            </p:childTnLst>
+                          </p:cTn>
+                        </p:par>
+                      </p:childTnLst>
+                    </p:cTn>
+                  </p:par>
+                  <p:par>
+                    <p:cTn id="11" fill="hold">
+                      <p:stCondLst>
+                        <p:cond delay="indefinite"/>
+                      </p:stCondLst>
+                      <p:childTnLst>
+                        <p:par>
+                          <p:cTn id="12" fill="hold">
+                            <p:stCondLst>
+                              <p:cond delay="0"/>
+                            </p:stCondLst>
+                            <p:childTnLst>
+                              <p:par>
+                                <p:cTn id="13" presetID="1" presetClass="entr" presetSubtype="0" fill="hold" grpId="0" nodeType="clickEffect">
+                                  <p:stCondLst>
+                                    <p:cond delay="0"/>
+                                  </p:stCondLst>
+                                  <p:childTnLst>
+                                    <p:set>
+                                      <p:cBhvr>
+                                        <p:cTn id="14" dur="1" fill="hold">
+                                          <p:stCondLst>
+                                            <p:cond delay="0"/>
+                                          </p:stCondLst>
+                                        </p:cTn>
+                                        <p:tgtEl>
+                                          <p:spTgt spid="2">
+                                            <p:txEl>
+                                              <p:pRg st="2" end="2"/>
+                                            </p:txEl>
+                                          </p:spTgt>
+                                        </p:tgtEl>
+                                        <p:attrNameLst>
+                                          <p:attrName>style.visibility</p:attrName>
+                                        </p:attrNameLst>
+                                      </p:cBhvr>
+                                      <p:to>
+                                        <p:strVal val="visible"/>
+                                      </p:to>
+                                    </p:set>
+                                  </p:childTnLst>
+                                </p:cTn>
+                              </p:par>
+                            </p:childTnLst>
+                          </p:cTn>
+                        </p:par>
+                      </p:childTnLst>
+                    </p:cTn>
+                  </p:par>
+                  <p:par>
+                    <p:cTn id="15" fill="hold">
+                      <p:stCondLst>
+                        <p:cond delay="indefinite"/>
+                      </p:stCondLst>
+                      <p:childTnLst>
+                        <p:par>
+                          <p:cTn id="16" fill="hold">
+                            <p:stCondLst>
+                              <p:cond delay="0"/>
+                            </p:stCondLst>
+                            <p:childTnLst>
+                              <p:par>
+                                <p:cTn id="17" presetID="1" presetClass="entr" presetSubtype="0" fill="hold" grpId="0" nodeType="clickEffect">
+                                  <p:stCondLst>
+                                    <p:cond delay="0"/>
+                                  </p:stCondLst>
+                                  <p:childTnLst>
+                                    <p:set>
+                                      <p:cBhvr>
+                                        <p:cTn id="18" dur="1" fill="hold">
+                                          <p:stCondLst>
+                                            <p:cond delay="0"/>
+                                          </p:stCondLst>
+                                        </p:cTn>
+                                        <p:tgtEl>
+                                          <p:spTgt spid="2">
+                                            <p:txEl>
+                                              <p:pRg st="3" end="3"/>
+                                            </p:txEl>
+                                          </p:spTgt>
+                                        </p:tgtEl>
+                                        <p:attrNameLst>
+                                          <p:attrName>style.visibility</p:attrName>
+                                        </p:attrNameLst>
+                                      </p:cBhvr>
+                                      <p:to>
+                                        <p:strVal val="visible"/>
+                                      </p:to>
+                                    </p:set>
+                                  </p:childTnLst>
+                                </p:cTn>
+                              </p:par>
+                            </p:childTnLst>
+                          </p:cTn>
+                        </p:par>
+                      </p:childTnLst>
+                    </p:cTn>
+                  </p:par>
+                  <p:par>
+                    <p:cTn id="19" fill="hold">
+                      <p:stCondLst>
+                        <p:cond delay="indefinite"/>
+                      </p:stCondLst>
+                      <p:childTnLst>
+                        <p:par>
+                          <p:cTn id="20" fill="hold">
+                            <p:stCondLst>
+                              <p:cond delay="0"/>
+                            </p:stCondLst>
+                            <p:childTnLst>
+                              <p:par>
+                                <p:cTn id="21" presetID="1" presetClass="entr" presetSubtype="0" fill="hold" grpId="0" nodeType="clickEffect">
+                                  <p:stCondLst>
+                                    <p:cond delay="0"/>
+                                  </p:stCondLst>
+                                  <p:childTnLst>
+                                    <p:set>
+                                      <p:cBhvr>
+                                        <p:cTn id="22" dur="1" fill="hold">
+                                          <p:stCondLst>
+                                            <p:cond delay="0"/>
+                                          </p:stCondLst>
+                                        </p:cTn>
+                                        <p:tgtEl>
+                                          <p:spTgt spid="2">
+                                            <p:txEl>
+                                              <p:pRg st="4" end="4"/>
+                                            </p:txEl>
+                                          </p:spTgt>
+                                        </p:tgtEl>
+                                        <p:attrNameLst>
+                                          <p:attrName>style.visibility</p:attrName>
+                                        </p:attrNameLst>
+                                      </p:cBhvr>
+                                      <p:to>
+                                        <p:strVal val="visible"/>
+                                      </p:to>
+                                    </p:set>
+                                  </p:childTnLst>
+                                </p:cTn>
+                              </p:par>
+                            </p:childTnLst>
+                          </p:cTn>
+                        </p:par>
+                      </p:childTnLst>
+                    </p:cTn>
+                  </p:par>
+                  <p:par>
+                    <p:cTn id="23" fill="hold">
+                      <p:stCondLst>
+                        <p:cond delay="indefinite"/>
+                      </p:stCondLst>
+                      <p:childTnLst>
+                        <p:par>
+                          <p:cTn id="24" fill="hold">
+                            <p:stCondLst>
+                              <p:cond delay="0"/>
+                            </p:stCondLst>
+                            <p:childTnLst>
+                              <p:par>
+                                <p:cTn id="25" presetID="1" presetClass="entr" presetSubtype="0" fill="hold" grpId="0" nodeType="clickEffect">
+                                  <p:stCondLst>
+                                    <p:cond delay="0"/>
+                                  </p:stCondLst>
+                                  <p:childTnLst>
+                                    <p:set>
+                                      <p:cBhvr>
+                                        <p:cTn id="26" dur="1" fill="hold">
+                                          <p:stCondLst>
+                                            <p:cond delay="0"/>
+                                          </p:stCondLst>
+                                        </p:cTn>
+                                        <p:tgtEl>
+                                          <p:spTgt spid="2">
+                                            <p:txEl>
+                                              <p:pRg st="6" end="6"/>
+                                            </p:txEl>
+                                          </p:spTgt>
+                                        </p:tgtEl>
+                                        <p:attrNameLst>
+                                          <p:attrName>style.visibility</p:attrName>
+                                        </p:attrNameLst>
+                                      </p:cBhvr>
+                                      <p:to>
+                                        <p:strVal val="visible"/>
+                                      </p:to>
+                                    </p:set>
+                                  </p:childTnLst>
+                                </p:cTn>
+                              </p:par>
+                              <p:par>
+                                <p:cTn id="27" presetID="1" presetClass="entr" presetSubtype="0" fill="hold" grpId="0" nodeType="withEffect">
+                                  <p:stCondLst>
+                                    <p:cond delay="0"/>
+                                  </p:stCondLst>
+                                  <p:childTnLst>
+                                    <p:set>
+                                      <p:cBhvr>
+                                        <p:cTn id="28" dur="1" fill="hold">
+                                          <p:stCondLst>
+                                            <p:cond delay="0"/>
+                                          </p:stCondLst>
+                                        </p:cTn>
+                                        <p:tgtEl>
+                                          <p:spTgt spid="2">
+                                            <p:txEl>
+                                              <p:pRg st="7" end="7"/>
+                                            </p:txEl>
+                                          </p:spTgt>
+                                        </p:tgtEl>
+                                        <p:attrNameLst>
+                                          <p:attrName>style.visibility</p:attrName>
+                                        </p:attrNameLst>
+                                      </p:cBhvr>
+                                      <p:to>
+                                        <p:strVal val="visible"/>
+                                      </p:to>
+                                    </p:set>
+                                  </p:childTnLst>
+                                </p:cTn>
+                              </p:par>
+                            </p:childTnLst>
+                          </p:cTn>
+                        </p:par>
+                      </p:childTnLst>
+                    </p:cTn>
+                  </p:par>
+                </p:childTnLst>
+              </p:cTn>
+              <p:prevCondLst>
+                <p:cond evt="onPrev" delay="0">
+                  <p:tgtEl>
+                    <p:sldTgt/>
+                  </p:tgtEl>
+                </p:cond>
+              </p:prevCondLst>
+              <p:nextCondLst>
+                <p:cond evt="onNext" delay="0">
+                  <p:tgtEl>
+                    <p:sldTgt/>
+                  </p:tgtEl>
+                </p:cond>
+              </p:nextCondLst>
+            </p:seq>
+          </p:childTnLst>
+        </p:cTn>
+      </p:par>
+    </p:tnLst>
+    <p:bldLst>
+      <p:bldP spid="2" grpId="0" uiExpand="1" build="p"/>
+    </p:bldLst>
+  </p:timing>
+</p:sld>
+</file>
+
+<file path=ppt/slides/slide11.xml><?xml version="1.0" encoding="utf-8"?>
+<p:sld xmlns:a="http://schemas.openxmlformats.org/drawingml/2006/main" xmlns:r="http://schemas.openxmlformats.org/officeDocument/2006/relationships" xmlns:p="http://schemas.openxmlformats.org/presentationml/2006/main">
+  <p:cSld>
+    <p:spTree>
+      <p:nvGrpSpPr>
+        <p:cNvPr id="1" name=""/>
+        <p:cNvGrpSpPr/>
+        <p:nvPr/>
+      </p:nvGrpSpPr>
+      <p:grpSpPr>
+        <a:xfrm>
+          <a:off x="0" y="0"/>
+          <a:ext cx="0" cy="0"/>
+          <a:chOff x="0" y="0"/>
+          <a:chExt cx="0" cy="0"/>
+        </a:xfrm>
+      </p:grpSpPr>
+      <p:sp>
+        <p:nvSpPr>
+          <p:cNvPr id="2" name="Inhaltsplatzhalter 1"/>
+          <p:cNvSpPr>
+            <a:spLocks noGrp="1"/>
+          </p:cNvSpPr>
+          <p:nvPr>
+            <p:ph sz="half" idx="1"/>
+          </p:nvPr>
+        </p:nvSpPr>
+        <p:spPr/>
+        <p:txBody>
+          <a:bodyPr/>
+          <a:lstStyle/>
+          <a:p>
+            <a:r>
+              <a:rPr lang="de-CH" dirty="0" smtClean="0"/>
+              <a:t>Bearbeitung im VS</a:t>
+            </a:r>
+          </a:p>
+          <a:p>
+            <a:endParaRPr lang="de-CH" dirty="0"/>
+          </a:p>
+          <a:p>
+            <a:endParaRPr lang="de-CH" dirty="0" smtClean="0"/>
+          </a:p>
+          <a:p>
+            <a:endParaRPr lang="de-CH" dirty="0"/>
+          </a:p>
+          <a:p>
+            <a:endParaRPr lang="de-CH" dirty="0" smtClean="0"/>
+          </a:p>
+          <a:p>
+            <a:endParaRPr lang="de-CH" dirty="0"/>
+          </a:p>
+          <a:p>
+            <a:endParaRPr lang="de-CH" dirty="0" smtClean="0"/>
+          </a:p>
+          <a:p>
+            <a:r>
+              <a:rPr lang="de-CH" dirty="0" smtClean="0"/>
+              <a:t>Rotation</a:t>
+            </a:r>
+          </a:p>
+          <a:p>
+            <a:endParaRPr lang="de-CH" dirty="0"/>
+          </a:p>
+          <a:p>
+            <a:r>
+              <a:rPr lang="de-CH" dirty="0" smtClean="0"/>
+              <a:t>Winkel </a:t>
+            </a:r>
+          </a:p>
+          <a:p>
+            <a:endParaRPr lang="de-CH" dirty="0"/>
+          </a:p>
+          <a:p>
+            <a:endParaRPr lang="de-CH" dirty="0" smtClean="0"/>
+          </a:p>
+          <a:p>
+            <a:endParaRPr lang="de-CH" dirty="0"/>
+          </a:p>
+        </p:txBody>
+      </p:sp>
+      <p:sp>
+        <p:nvSpPr>
+          <p:cNvPr id="3" name="Titel 2"/>
+          <p:cNvSpPr>
+            <a:spLocks noGrp="1"/>
+          </p:cNvSpPr>
+          <p:nvPr>
+            <p:ph type="ctrTitle"/>
+          </p:nvPr>
+        </p:nvSpPr>
+        <p:spPr/>
+        <p:txBody>
+          <a:bodyPr/>
+          <a:lstStyle/>
+          <a:p>
+            <a:r>
+              <a:rPr lang="de-CH" dirty="0" smtClean="0"/>
+              <a:t>Models</a:t>
+            </a:r>
+            <a:endParaRPr lang="de-CH" dirty="0"/>
+          </a:p>
+        </p:txBody>
+      </p:sp>
+      <p:pic>
+        <p:nvPicPr>
+          <p:cNvPr id="4" name="Grafik 3"/>
+          <p:cNvPicPr>
+            <a:picLocks noChangeAspect="1"/>
+          </p:cNvPicPr>
+          <p:nvPr/>
+        </p:nvPicPr>
+        <p:blipFill>
+          <a:blip r:embed="rId2"/>
+          <a:stretch>
+            <a:fillRect/>
+          </a:stretch>
+        </p:blipFill>
+        <p:spPr>
+          <a:xfrm>
+            <a:off x="719824" y="1833710"/>
+            <a:ext cx="2894228" cy="1352550"/>
+          </a:xfrm>
+          <a:prstGeom prst="rect">
+            <a:avLst/>
+          </a:prstGeom>
+        </p:spPr>
+      </p:pic>
+      <p:sp>
+        <p:nvSpPr>
+          <p:cNvPr id="5" name="Pfeil nach rechts 4"/>
+          <p:cNvSpPr/>
+          <p:nvPr/>
+        </p:nvSpPr>
+        <p:spPr>
+          <a:xfrm rot="1789590">
+            <a:off x="3906911" y="3278005"/>
+            <a:ext cx="857840" cy="393471"/>
+          </a:xfrm>
+          <a:prstGeom prst="rightArrow">
+            <a:avLst/>
+          </a:prstGeom>
+        </p:spPr>
+        <p:style>
+          <a:lnRef idx="1">
+            <a:schemeClr val="accent1"/>
+          </a:lnRef>
+          <a:fillRef idx="3">
+            <a:schemeClr val="accent1"/>
+          </a:fillRef>
+          <a:effectRef idx="2">
+            <a:schemeClr val="accent1"/>
+          </a:effectRef>
+          <a:fontRef idx="minor">
+            <a:schemeClr val="lt1"/>
+          </a:fontRef>
+        </p:style>
+        <p:txBody>
+          <a:bodyPr rtlCol="0" anchor="ctr"/>
+          <a:lstStyle/>
+          <a:p>
+            <a:pPr algn="ctr"/>
+            <a:endParaRPr lang="de-CH"/>
+          </a:p>
+        </p:txBody>
+      </p:sp>
+      <p:pic>
+        <p:nvPicPr>
+          <p:cNvPr id="6" name="Grafik 5"/>
+          <p:cNvPicPr>
+            <a:picLocks noChangeAspect="1"/>
+          </p:cNvPicPr>
+          <p:nvPr/>
+        </p:nvPicPr>
+        <p:blipFill>
+          <a:blip r:embed="rId3"/>
+          <a:stretch>
+            <a:fillRect/>
+          </a:stretch>
+        </p:blipFill>
+        <p:spPr>
+          <a:xfrm>
+            <a:off x="5528188" y="1833710"/>
+            <a:ext cx="2531730" cy="1352550"/>
+          </a:xfrm>
+          <a:prstGeom prst="rect">
+            <a:avLst/>
+          </a:prstGeom>
+        </p:spPr>
+      </p:pic>
+      <p:sp>
+        <p:nvSpPr>
+          <p:cNvPr id="7" name="Pfeil nach rechts 6"/>
+          <p:cNvSpPr/>
+          <p:nvPr/>
+        </p:nvSpPr>
+        <p:spPr>
+          <a:xfrm>
+            <a:off x="3906911" y="2313250"/>
+            <a:ext cx="857840" cy="393471"/>
+          </a:xfrm>
+          <a:prstGeom prst="rightArrow">
+            <a:avLst/>
+          </a:prstGeom>
+        </p:spPr>
+        <p:style>
+          <a:lnRef idx="1">
+            <a:schemeClr val="accent1"/>
+          </a:lnRef>
+          <a:fillRef idx="3">
+            <a:schemeClr val="accent1"/>
+          </a:fillRef>
+          <a:effectRef idx="2">
+            <a:schemeClr val="accent1"/>
+          </a:effectRef>
+          <a:fontRef idx="minor">
+            <a:schemeClr val="lt1"/>
+          </a:fontRef>
+        </p:style>
+        <p:txBody>
+          <a:bodyPr rtlCol="0" anchor="ctr"/>
+          <a:lstStyle/>
+          <a:p>
+            <a:pPr algn="ctr"/>
+            <a:endParaRPr lang="de-CH"/>
+          </a:p>
+        </p:txBody>
+      </p:sp>
+      <p:pic>
+        <p:nvPicPr>
+          <p:cNvPr id="8" name="Grafik 7"/>
+          <p:cNvPicPr>
+            <a:picLocks noChangeAspect="1"/>
+          </p:cNvPicPr>
+          <p:nvPr/>
+        </p:nvPicPr>
+        <p:blipFill>
+          <a:blip r:embed="rId4"/>
+          <a:stretch>
+            <a:fillRect/>
+          </a:stretch>
+        </p:blipFill>
+        <p:spPr>
+          <a:xfrm>
+            <a:off x="5539529" y="3579971"/>
+            <a:ext cx="2294727" cy="2466043"/>
+          </a:xfrm>
+          <a:prstGeom prst="rect">
+            <a:avLst/>
+          </a:prstGeom>
+        </p:spPr>
+      </p:pic>
+    </p:spTree>
+    <p:extLst>
+      <p:ext uri="{BB962C8B-B14F-4D97-AF65-F5344CB8AC3E}">
+        <p14:creationId xmlns:p14="http://schemas.microsoft.com/office/powerpoint/2010/main" val="3204799013"/>
+      </p:ext>
+    </p:extLst>
+  </p:cSld>
+  <p:clrMapOvr>
+    <a:masterClrMapping/>
+  </p:clrMapOvr>
+  <p:timing>
+    <p:tnLst>
+      <p:par>
+        <p:cTn id="1" dur="indefinite" restart="never" nodeType="tmRoot"/>
+      </p:par>
+    </p:tnLst>
+  </p:timing>
+</p:sld>
+</file>
+
+<file path=ppt/slides/slide12.xml><?xml version="1.0" encoding="utf-8"?>
+<p:sld xmlns:a="http://schemas.openxmlformats.org/drawingml/2006/main" xmlns:r="http://schemas.openxmlformats.org/officeDocument/2006/relationships" xmlns:p="http://schemas.openxmlformats.org/presentationml/2006/main">
+  <p:cSld>
+    <p:spTree>
+      <p:nvGrpSpPr>
+        <p:cNvPr id="1" name=""/>
+        <p:cNvGrpSpPr/>
+        <p:nvPr/>
+      </p:nvGrpSpPr>
+      <p:grpSpPr>
+        <a:xfrm>
+          <a:off x="0" y="0"/>
+          <a:ext cx="0" cy="0"/>
+          <a:chOff x="0" y="0"/>
+          <a:chExt cx="0" cy="0"/>
+        </a:xfrm>
+      </p:grpSpPr>
+      <p:sp>
+        <p:nvSpPr>
+          <p:cNvPr id="2" name="Inhaltsplatzhalter 1"/>
+          <p:cNvSpPr>
+            <a:spLocks noGrp="1"/>
+          </p:cNvSpPr>
+          <p:nvPr>
+            <p:ph sz="half" idx="1"/>
+          </p:nvPr>
+        </p:nvSpPr>
+        <p:spPr/>
+        <p:txBody>
+          <a:bodyPr/>
+          <a:lstStyle/>
+          <a:p>
+            <a:r>
+              <a:rPr lang="de-CH" dirty="0" smtClean="0"/>
               <a:t>Punkte, Zeit </a:t>
             </a:r>
           </a:p>
@@ -7271,7 +8298,11 @@
             <a:pPr lvl="1"/>
             <a:r>
               <a:rPr lang="de-CH" dirty="0" smtClean="0"/>
-              <a:t>Exposition nach Zeit</a:t>
+              <a:t>Explosion nach </a:t>
+            </a:r>
+            <a:r>
+              <a:rPr lang="de-CH" dirty="0" smtClean="0"/>
+              <a:t>Zeit</a:t>
             </a:r>
           </a:p>
           <a:p>
@@ -7535,7 +8566,15 @@
             <a:pPr lvl="1"/>
             <a:r>
               <a:rPr lang="de-CH" dirty="0" smtClean="0"/>
-              <a:t>Erweiterungen für Punkte, Zeit</a:t>
+              <a:t>Erweiterungen für </a:t>
+            </a:r>
+            <a:r>
+              <a:rPr lang="de-CH" dirty="0" smtClean="0"/>
+              <a:t>Punkte und </a:t>
+            </a:r>
+            <a:r>
+              <a:rPr lang="de-CH" dirty="0" smtClean="0"/>
+              <a:t>Zeit</a:t>
             </a:r>
           </a:p>
           <a:p>
@@ -8536,6 +9575,86 @@
           <a:bodyPr/>
           <a:lstStyle/>
           <a:p>
+            <a:r>
+              <a:rPr lang="de-CH" dirty="0" err="1" smtClean="0"/>
+              <a:t>Prefab</a:t>
+            </a:r>
+            <a:r>
+              <a:rPr lang="de-CH" dirty="0" smtClean="0"/>
+              <a:t> (</a:t>
+            </a:r>
+            <a:r>
+              <a:rPr lang="de-CH" dirty="0" err="1" smtClean="0"/>
+              <a:t>Rigidbody</a:t>
+            </a:r>
+            <a:r>
+              <a:rPr lang="de-CH" dirty="0" smtClean="0"/>
+              <a:t>) instanziieren</a:t>
+            </a:r>
+          </a:p>
+          <a:p>
+            <a:r>
+              <a:rPr lang="de-CH" dirty="0" smtClean="0"/>
+              <a:t>Position von </a:t>
+            </a:r>
+            <a:r>
+              <a:rPr lang="de-CH" dirty="0" err="1" smtClean="0"/>
+              <a:t>Turret</a:t>
+            </a:r>
+            <a:r>
+              <a:rPr lang="de-CH" dirty="0" smtClean="0"/>
+              <a:t> übernehmen</a:t>
+            </a:r>
+          </a:p>
+          <a:p>
+            <a:r>
+              <a:rPr lang="de-CH" dirty="0" smtClean="0"/>
+              <a:t>Force hinzufügen</a:t>
+            </a:r>
+          </a:p>
+          <a:p>
+            <a:r>
+              <a:rPr lang="de-CH" dirty="0" smtClean="0"/>
+              <a:t>Sound abspielen</a:t>
+            </a:r>
+          </a:p>
+          <a:p>
+            <a:r>
+              <a:rPr lang="de-CH" dirty="0" smtClean="0"/>
+              <a:t>Nach Timeout </a:t>
+            </a:r>
+            <a:r>
+              <a:rPr lang="de-CH" dirty="0" err="1" smtClean="0"/>
+              <a:t>GameObject</a:t>
+            </a:r>
+            <a:r>
+              <a:rPr lang="de-CH" dirty="0" smtClean="0"/>
+              <a:t> zerstören</a:t>
+            </a:r>
+          </a:p>
+          <a:p>
+            <a:pPr lvl="1"/>
+            <a:endParaRPr lang="de-CH" dirty="0"/>
+          </a:p>
+          <a:p>
+            <a:endParaRPr lang="de-CH" dirty="0" smtClean="0"/>
+          </a:p>
+          <a:p>
+            <a:endParaRPr lang="de-CH" dirty="0"/>
+          </a:p>
+          <a:p>
+            <a:endParaRPr lang="de-CH" dirty="0" smtClean="0"/>
+          </a:p>
+          <a:p>
+            <a:pPr marL="457200" lvl="1" indent="0">
+              <a:buNone/>
+            </a:pPr>
+            <a:endParaRPr lang="de-CH" dirty="0" smtClean="0"/>
+          </a:p>
+          <a:p>
+            <a:endParaRPr lang="de-CH" dirty="0" smtClean="0"/>
+          </a:p>
+          <a:p>
             <a:endParaRPr lang="de-CH" dirty="0"/>
           </a:p>
         </p:txBody>
@@ -8563,6 +9682,36 @@
           </a:p>
         </p:txBody>
       </p:sp>
+      <p:pic>
+        <p:nvPicPr>
+          <p:cNvPr id="5" name="Grafik 4"/>
+          <p:cNvPicPr>
+            <a:picLocks noChangeAspect="1"/>
+          </p:cNvPicPr>
+          <p:nvPr/>
+        </p:nvPicPr>
+        <p:blipFill>
+          <a:blip r:embed="rId2">
+            <a:extLst>
+              <a:ext uri="{28A0092B-C50C-407E-A947-70E740481C1C}">
+                <a14:useLocalDpi xmlns:a14="http://schemas.microsoft.com/office/drawing/2010/main" val="0"/>
+              </a:ext>
+            </a:extLst>
+          </a:blip>
+          <a:stretch>
+            <a:fillRect/>
+          </a:stretch>
+        </p:blipFill>
+        <p:spPr>
+          <a:xfrm>
+            <a:off x="6087118" y="560512"/>
+            <a:ext cx="2041539" cy="1758973"/>
+          </a:xfrm>
+          <a:prstGeom prst="rect">
+            <a:avLst/>
+          </a:prstGeom>
+        </p:spPr>
+      </p:pic>
     </p:spTree>
     <p:extLst>
       <p:ext uri="{BB962C8B-B14F-4D97-AF65-F5344CB8AC3E}">
@@ -8617,50 +9766,40 @@
           <a:p>
             <a:r>
               <a:rPr lang="de-CH" dirty="0" smtClean="0"/>
-              <a:t>Bearbeitung im VS</a:t>
-            </a:r>
-          </a:p>
-          <a:p>
+              <a:t>Gleichzeitig Explosion (Partikelsystem) instanziieren</a:t>
+            </a:r>
             <a:endParaRPr lang="de-CH" dirty="0"/>
           </a:p>
           <a:p>
+            <a:r>
+              <a:rPr lang="de-CH" dirty="0"/>
+              <a:t>Zufälliger Sound </a:t>
+            </a:r>
+            <a:r>
+              <a:rPr lang="de-CH" dirty="0" smtClean="0"/>
+              <a:t>abspielen</a:t>
+            </a:r>
+          </a:p>
+          <a:p>
+            <a:r>
+              <a:rPr lang="de-CH" dirty="0" err="1" smtClean="0"/>
+              <a:t>ExplosionForce</a:t>
+            </a:r>
+            <a:r>
+              <a:rPr lang="de-CH" dirty="0" smtClean="0"/>
+              <a:t> für nahe </a:t>
+            </a:r>
+            <a:r>
+              <a:rPr lang="de-CH" dirty="0" err="1" smtClean="0"/>
+              <a:t>Rigidbodies</a:t>
+            </a:r>
             <a:endParaRPr lang="de-CH" dirty="0" smtClean="0"/>
           </a:p>
           <a:p>
             <a:endParaRPr lang="de-CH" dirty="0"/>
           </a:p>
           <a:p>
-            <a:endParaRPr lang="de-CH" dirty="0" smtClean="0"/>
-          </a:p>
-          <a:p>
-            <a:endParaRPr lang="de-CH" dirty="0"/>
-          </a:p>
-          <a:p>
-            <a:endParaRPr lang="de-CH" dirty="0" smtClean="0"/>
-          </a:p>
-          <a:p>
-            <a:r>
-              <a:rPr lang="de-CH" dirty="0" smtClean="0"/>
-              <a:t>Rotation</a:t>
-            </a:r>
-          </a:p>
-          <a:p>
-            <a:endParaRPr lang="de-CH" dirty="0"/>
-          </a:p>
-          <a:p>
-            <a:r>
-              <a:rPr lang="de-CH" dirty="0" smtClean="0"/>
-              <a:t>Winkel </a:t>
-            </a:r>
-          </a:p>
-          <a:p>
-            <a:endParaRPr lang="de-CH" dirty="0"/>
-          </a:p>
-          <a:p>
-            <a:endParaRPr lang="de-CH" dirty="0" smtClean="0"/>
-          </a:p>
-          <a:p>
-            <a:endParaRPr lang="de-CH" dirty="0"/>
+            <a:endParaRPr lang="en-US" dirty="0"/>
           </a:p>
         </p:txBody>
       </p:sp>
@@ -8680,10 +9819,10 @@
           <a:lstStyle/>
           <a:p>
             <a:r>
-              <a:rPr lang="de-CH" dirty="0" smtClean="0"/>
-              <a:t>Models</a:t>
-            </a:r>
-            <a:endParaRPr lang="de-CH" dirty="0"/>
+              <a:rPr lang="de-CH" dirty="0" err="1" smtClean="0"/>
+              <a:t>Rockets</a:t>
+            </a:r>
+            <a:endParaRPr lang="en-US" dirty="0"/>
           </a:p>
         </p:txBody>
       </p:sp>
@@ -8696,139 +9835,21 @@
           <p:nvPr/>
         </p:nvPicPr>
         <p:blipFill>
-          <a:blip r:embed="rId2"/>
+          <a:blip r:embed="rId3">
+            <a:extLst>
+              <a:ext uri="{28A0092B-C50C-407E-A947-70E740481C1C}">
+                <a14:useLocalDpi xmlns:a14="http://schemas.microsoft.com/office/drawing/2010/main" val="0"/>
+              </a:ext>
+            </a:extLst>
+          </a:blip>
           <a:stretch>
             <a:fillRect/>
           </a:stretch>
         </p:blipFill>
         <p:spPr>
           <a:xfrm>
-            <a:off x="719824" y="1833710"/>
-            <a:ext cx="2894228" cy="1352550"/>
-          </a:xfrm>
-          <a:prstGeom prst="rect">
-            <a:avLst/>
-          </a:prstGeom>
-        </p:spPr>
-      </p:pic>
-      <p:sp>
-        <p:nvSpPr>
-          <p:cNvPr id="5" name="Pfeil nach rechts 4"/>
-          <p:cNvSpPr/>
-          <p:nvPr/>
-        </p:nvSpPr>
-        <p:spPr>
-          <a:xfrm rot="1789590">
-            <a:off x="3906911" y="3278005"/>
-            <a:ext cx="857840" cy="393471"/>
-          </a:xfrm>
-          <a:prstGeom prst="rightArrow">
-            <a:avLst/>
-          </a:prstGeom>
-        </p:spPr>
-        <p:style>
-          <a:lnRef idx="1">
-            <a:schemeClr val="accent1"/>
-          </a:lnRef>
-          <a:fillRef idx="3">
-            <a:schemeClr val="accent1"/>
-          </a:fillRef>
-          <a:effectRef idx="2">
-            <a:schemeClr val="accent1"/>
-          </a:effectRef>
-          <a:fontRef idx="minor">
-            <a:schemeClr val="lt1"/>
-          </a:fontRef>
-        </p:style>
-        <p:txBody>
-          <a:bodyPr rtlCol="0" anchor="ctr"/>
-          <a:lstStyle/>
-          <a:p>
-            <a:pPr algn="ctr"/>
-            <a:endParaRPr lang="de-CH"/>
-          </a:p>
-        </p:txBody>
-      </p:sp>
-      <p:pic>
-        <p:nvPicPr>
-          <p:cNvPr id="6" name="Grafik 5"/>
-          <p:cNvPicPr>
-            <a:picLocks noChangeAspect="1"/>
-          </p:cNvPicPr>
-          <p:nvPr/>
-        </p:nvPicPr>
-        <p:blipFill>
-          <a:blip r:embed="rId3"/>
-          <a:stretch>
-            <a:fillRect/>
-          </a:stretch>
-        </p:blipFill>
-        <p:spPr>
-          <a:xfrm>
-            <a:off x="5528188" y="1833710"/>
-            <a:ext cx="2531730" cy="1352550"/>
-          </a:xfrm>
-          <a:prstGeom prst="rect">
-            <a:avLst/>
-          </a:prstGeom>
-        </p:spPr>
-      </p:pic>
-      <p:sp>
-        <p:nvSpPr>
-          <p:cNvPr id="7" name="Pfeil nach rechts 6"/>
-          <p:cNvSpPr/>
-          <p:nvPr/>
-        </p:nvSpPr>
-        <p:spPr>
-          <a:xfrm>
-            <a:off x="3906911" y="2313250"/>
-            <a:ext cx="857840" cy="393471"/>
-          </a:xfrm>
-          <a:prstGeom prst="rightArrow">
-            <a:avLst/>
-          </a:prstGeom>
-        </p:spPr>
-        <p:style>
-          <a:lnRef idx="1">
-            <a:schemeClr val="accent1"/>
-          </a:lnRef>
-          <a:fillRef idx="3">
-            <a:schemeClr val="accent1"/>
-          </a:fillRef>
-          <a:effectRef idx="2">
-            <a:schemeClr val="accent1"/>
-          </a:effectRef>
-          <a:fontRef idx="minor">
-            <a:schemeClr val="lt1"/>
-          </a:fontRef>
-        </p:style>
-        <p:txBody>
-          <a:bodyPr rtlCol="0" anchor="ctr"/>
-          <a:lstStyle/>
-          <a:p>
-            <a:pPr algn="ctr"/>
-            <a:endParaRPr lang="de-CH"/>
-          </a:p>
-        </p:txBody>
-      </p:sp>
-      <p:pic>
-        <p:nvPicPr>
-          <p:cNvPr id="8" name="Grafik 7"/>
-          <p:cNvPicPr>
-            <a:picLocks noChangeAspect="1"/>
-          </p:cNvPicPr>
-          <p:nvPr/>
-        </p:nvPicPr>
-        <p:blipFill>
-          <a:blip r:embed="rId4"/>
-          <a:stretch>
-            <a:fillRect/>
-          </a:stretch>
-        </p:blipFill>
-        <p:spPr>
-          <a:xfrm>
-            <a:off x="5539529" y="3579971"/>
-            <a:ext cx="2294727" cy="2466043"/>
+            <a:off x="797513" y="3678862"/>
+            <a:ext cx="3395546" cy="2017280"/>
           </a:xfrm>
           <a:prstGeom prst="rect">
             <a:avLst/>
@@ -8838,7 +9859,7 @@
     </p:spTree>
     <p:extLst>
       <p:ext uri="{BB962C8B-B14F-4D97-AF65-F5344CB8AC3E}">
-        <p14:creationId xmlns:p14="http://schemas.microsoft.com/office/powerpoint/2010/main" val="3204799013"/>
+        <p14:creationId xmlns:p14="http://schemas.microsoft.com/office/powerpoint/2010/main" val="1597542597"/>
       </p:ext>
     </p:extLst>
   </p:cSld>
@@ -9825,6 +10846,15 @@
 </file>
 
 <file path=customXml/item2.xml><?xml version="1.0" encoding="utf-8"?>
+<?mso-contentType ?>
+<FormTemplates xmlns="http://schemas.microsoft.com/sharepoint/v3/contenttype/forms">
+  <Display>DocumentLibraryForm</Display>
+  <Edit>DocumentLibraryForm</Edit>
+  <New>DocumentLibraryForm</New>
+</FormTemplates>
+</file>
+
+<file path=customXml/item3.xml><?xml version="1.0" encoding="utf-8"?>
 <p:properties xmlns:p="http://schemas.microsoft.com/office/2006/metadata/properties" xmlns:xsi="http://www.w3.org/2001/XMLSchema-instance" xmlns:pc="http://schemas.microsoft.com/office/infopath/2007/PartnerControls">
   <documentManagement>
     <BfhIntranetDepartmentText xmlns="63c724b1-652e-424f-8d99-4ee509067280">
@@ -9838,15 +10868,6 @@
     <QMPilot_DokID xmlns="2551ef7e-3b29-44d1-a8ad-ef34c26bfc60">469</QMPilot_DokID>
   </documentManagement>
 </p:properties>
-</file>
-
-<file path=customXml/item3.xml><?xml version="1.0" encoding="utf-8"?>
-<?mso-contentType ?>
-<FormTemplates xmlns="http://schemas.microsoft.com/sharepoint/v3/contenttype/forms">
-  <Display>DocumentLibraryForm</Display>
-  <Edit>DocumentLibraryForm</Edit>
-  <New>DocumentLibraryForm</New>
-</FormTemplates>
 </file>
 
 <file path=customXml/itemProps1.xml><?xml version="1.0" encoding="utf-8"?>
@@ -9869,6 +10890,14 @@
 </file>
 
 <file path=customXml/itemProps2.xml><?xml version="1.0" encoding="utf-8"?>
+<ds:datastoreItem xmlns:ds="http://schemas.openxmlformats.org/officeDocument/2006/customXml" ds:itemID="{CCF5E5E7-7F77-47A8-99A9-B4D5839292F3}">
+  <ds:schemaRefs>
+    <ds:schemaRef ds:uri="http://schemas.microsoft.com/sharepoint/v3/contenttype/forms"/>
+  </ds:schemaRefs>
+</ds:datastoreItem>
+</file>
+
+<file path=customXml/itemProps3.xml><?xml version="1.0" encoding="utf-8"?>
 <ds:datastoreItem xmlns:ds="http://schemas.openxmlformats.org/officeDocument/2006/customXml" ds:itemID="{96591048-6F15-48C6-9650-9BFF3E56974F}">
   <ds:schemaRefs>
     <ds:schemaRef ds:uri="http://schemas.microsoft.com/office/2006/metadata/properties"/>
@@ -9877,12 +10906,4 @@
     <ds:schemaRef ds:uri="2551ef7e-3b29-44d1-a8ad-ef34c26bfc60"/>
   </ds:schemaRefs>
 </ds:datastoreItem>
-</file>
-
-<file path=customXml/itemProps3.xml><?xml version="1.0" encoding="utf-8"?>
-<ds:datastoreItem xmlns:ds="http://schemas.openxmlformats.org/officeDocument/2006/customXml" ds:itemID="{CCF5E5E7-7F77-47A8-99A9-B4D5839292F3}">
-  <ds:schemaRefs>
-    <ds:schemaRef ds:uri="http://schemas.microsoft.com/sharepoint/v3/contenttype/forms"/>
-  </ds:schemaRefs>
-</ds:datastoreItem>
 </file>
</xml_diff>

<commit_message>
updated presentation and added it as pdf
</commit_message>
<xml_diff>
--- a/Docs/RocketShooter.pptx
+++ b/Docs/RocketShooter.pptx
@@ -5,24 +5,21 @@
     <p:sldMasterId id="2147483669" r:id="rId4"/>
   </p:sldMasterIdLst>
   <p:notesMasterIdLst>
-    <p:notesMasterId r:id="rId17"/>
+    <p:notesMasterId r:id="rId14"/>
   </p:notesMasterIdLst>
   <p:handoutMasterIdLst>
-    <p:handoutMasterId r:id="rId18"/>
+    <p:handoutMasterId r:id="rId15"/>
   </p:handoutMasterIdLst>
   <p:sldIdLst>
     <p:sldId id="256" r:id="rId5"/>
-    <p:sldId id="257" r:id="rId6"/>
-    <p:sldId id="258" r:id="rId7"/>
-    <p:sldId id="260" r:id="rId8"/>
-    <p:sldId id="259" r:id="rId9"/>
-    <p:sldId id="261" r:id="rId10"/>
-    <p:sldId id="265" r:id="rId11"/>
-    <p:sldId id="262" r:id="rId12"/>
-    <p:sldId id="266" r:id="rId13"/>
-    <p:sldId id="267" r:id="rId14"/>
-    <p:sldId id="263" r:id="rId15"/>
-    <p:sldId id="264" r:id="rId16"/>
+    <p:sldId id="259" r:id="rId6"/>
+    <p:sldId id="261" r:id="rId7"/>
+    <p:sldId id="265" r:id="rId8"/>
+    <p:sldId id="262" r:id="rId9"/>
+    <p:sldId id="266" r:id="rId10"/>
+    <p:sldId id="267" r:id="rId11"/>
+    <p:sldId id="263" r:id="rId12"/>
+    <p:sldId id="264" r:id="rId13"/>
   </p:sldIdLst>
   <p:sldSz cx="9144000" cy="6858000" type="screen4x3"/>
   <p:notesSz cx="6797675" cy="9872663"/>
@@ -153,7 +150,7 @@
   </p:defaultTextStyle>
   <p:extLst>
     <p:ext uri="{EFAFB233-063F-42B5-8137-9DF3F51BA10A}">
-      <p15:sldGuideLst xmlns:p15="http://schemas.microsoft.com/office/powerpoint/2012/main">
+      <p15:sldGuideLst xmlns:p15="http://schemas.microsoft.com/office/powerpoint/2012/main" xmlns="">
         <p15:guide id="1" orient="horz" pos="2160">
           <p15:clr>
             <a:srgbClr val="A4A3A4"/>
@@ -167,7 +164,7 @@
       </p15:sldGuideLst>
     </p:ext>
     <p:ext uri="{2D200454-40CA-4A62-9FC3-DE9A4176ACB9}">
-      <p15:notesGuideLst xmlns:p15="http://schemas.microsoft.com/office/powerpoint/2012/main">
+      <p15:notesGuideLst xmlns:p15="http://schemas.microsoft.com/office/powerpoint/2012/main" xmlns="">
         <p15:guide id="1" orient="horz" pos="3110">
           <p15:clr>
             <a:srgbClr val="A4A3A4"/>
@@ -266,7 +263,7 @@
           <a:p>
             <a:fld id="{EFA0D184-D464-48E9-9CA0-A94E873F6C2C}" type="datetimeFigureOut">
               <a:rPr lang="de-CH" smtClean="0"/>
-              <a:t>07.06.2015</a:t>
+              <a:t>09.06.2015</a:t>
             </a:fld>
             <a:endParaRPr lang="de-CH"/>
           </a:p>
@@ -431,7 +428,7 @@
           <a:p>
             <a:fld id="{5AF2B663-2BA9-4D7E-8201-5DE4109E1EDD}" type="datetimeFigureOut">
               <a:rPr lang="de-CH" smtClean="0"/>
-              <a:t>07.06.2015</a:t>
+              <a:t>09.06.2015</a:t>
             </a:fld>
             <a:endParaRPr lang="de-CH"/>
           </a:p>
@@ -920,7 +917,7 @@
           <a:p>
             <a:fld id="{37E44704-8E6D-4CF2-8CFA-A0F7BC751896}" type="slidenum">
               <a:rPr lang="de-CH" smtClean="0"/>
-              <a:t>9</a:t>
+              <a:t>6</a:t>
             </a:fld>
             <a:endParaRPr lang="de-CH"/>
           </a:p>
@@ -1004,7 +1001,7 @@
           <a:p>
             <a:fld id="{37E44704-8E6D-4CF2-8CFA-A0F7BC751896}" type="slidenum">
               <a:rPr lang="de-CH" smtClean="0"/>
-              <a:t>10</a:t>
+              <a:t>7</a:t>
             </a:fld>
             <a:endParaRPr lang="de-CH"/>
           </a:p>
@@ -7181,7 +7178,7 @@
 </p:sld>
 </file>
 
-<file path=ppt/slides/slide10.xml><?xml version="1.0" encoding="utf-8"?>
+<file path=ppt/slides/slide2.xml><?xml version="1.0" encoding="utf-8"?>
 <p:sld xmlns:a="http://schemas.openxmlformats.org/drawingml/2006/main" xmlns:r="http://schemas.openxmlformats.org/officeDocument/2006/relationships" xmlns:p="http://schemas.openxmlformats.org/presentationml/2006/main">
   <p:cSld>
     <p:spTree>
@@ -7215,6 +7212,1366 @@
           <a:p>
             <a:r>
               <a:rPr lang="de-CH" dirty="0" smtClean="0"/>
+              <a:t>Multiplayer</a:t>
+            </a:r>
+          </a:p>
+          <a:p>
+            <a:pPr lvl="1"/>
+            <a:endParaRPr lang="de-CH" dirty="0"/>
+          </a:p>
+          <a:p>
+            <a:r>
+              <a:rPr lang="de-CH" dirty="0" err="1" smtClean="0"/>
+              <a:t>Rockets</a:t>
+            </a:r>
+            <a:endParaRPr lang="de-CH" dirty="0" smtClean="0"/>
+          </a:p>
+          <a:p>
+            <a:pPr lvl="1"/>
+            <a:endParaRPr lang="de-CH" dirty="0"/>
+          </a:p>
+          <a:p>
+            <a:r>
+              <a:rPr lang="de-CH" dirty="0" smtClean="0"/>
+              <a:t>Models</a:t>
+            </a:r>
+          </a:p>
+          <a:p>
+            <a:pPr lvl="1"/>
+            <a:endParaRPr lang="de-CH" dirty="0"/>
+          </a:p>
+          <a:p>
+            <a:r>
+              <a:rPr lang="de-CH" dirty="0" smtClean="0"/>
+              <a:t>GUI</a:t>
+            </a:r>
+            <a:endParaRPr lang="de-CH" dirty="0" smtClean="0"/>
+          </a:p>
+        </p:txBody>
+      </p:sp>
+      <p:sp>
+        <p:nvSpPr>
+          <p:cNvPr id="3" name="Titel 2"/>
+          <p:cNvSpPr>
+            <a:spLocks noGrp="1"/>
+          </p:cNvSpPr>
+          <p:nvPr>
+            <p:ph type="ctrTitle"/>
+          </p:nvPr>
+        </p:nvSpPr>
+        <p:spPr/>
+        <p:txBody>
+          <a:bodyPr/>
+          <a:lstStyle/>
+          <a:p>
+            <a:r>
+              <a:rPr lang="de-CH" dirty="0" smtClean="0"/>
+              <a:t>Erweiterungen</a:t>
+            </a:r>
+            <a:endParaRPr lang="de-CH" dirty="0"/>
+          </a:p>
+        </p:txBody>
+      </p:sp>
+    </p:spTree>
+    <p:extLst>
+      <p:ext uri="{BB962C8B-B14F-4D97-AF65-F5344CB8AC3E}">
+        <p14:creationId xmlns:p14="http://schemas.microsoft.com/office/powerpoint/2010/main" val="3990788436"/>
+      </p:ext>
+    </p:extLst>
+  </p:cSld>
+  <p:clrMapOvr>
+    <a:masterClrMapping/>
+  </p:clrMapOvr>
+  <p:timing>
+    <p:tnLst>
+      <p:par>
+        <p:cTn id="1" dur="indefinite" restart="never" nodeType="tmRoot"/>
+      </p:par>
+    </p:tnLst>
+  </p:timing>
+</p:sld>
+</file>
+
+<file path=ppt/slides/slide3.xml><?xml version="1.0" encoding="utf-8"?>
+<p:sld xmlns:a="http://schemas.openxmlformats.org/drawingml/2006/main" xmlns:r="http://schemas.openxmlformats.org/officeDocument/2006/relationships" xmlns:p="http://schemas.openxmlformats.org/presentationml/2006/main">
+  <p:cSld>
+    <p:spTree>
+      <p:nvGrpSpPr>
+        <p:cNvPr id="1" name=""/>
+        <p:cNvGrpSpPr/>
+        <p:nvPr/>
+      </p:nvGrpSpPr>
+      <p:grpSpPr>
+        <a:xfrm>
+          <a:off x="0" y="0"/>
+          <a:ext cx="0" cy="0"/>
+          <a:chOff x="0" y="0"/>
+          <a:chExt cx="0" cy="0"/>
+        </a:xfrm>
+      </p:grpSpPr>
+      <p:sp>
+        <p:nvSpPr>
+          <p:cNvPr id="2" name="Inhaltsplatzhalter 1"/>
+          <p:cNvSpPr>
+            <a:spLocks noGrp="1"/>
+          </p:cNvSpPr>
+          <p:nvPr>
+            <p:ph sz="half" idx="1"/>
+          </p:nvPr>
+        </p:nvSpPr>
+        <p:spPr/>
+        <p:txBody>
+          <a:bodyPr/>
+          <a:lstStyle/>
+          <a:p>
+            <a:r>
+              <a:rPr lang="de-CH" dirty="0" smtClean="0"/>
+              <a:t>Connect </a:t>
+            </a:r>
+            <a:r>
+              <a:rPr lang="de-CH" dirty="0" err="1" smtClean="0"/>
+              <a:t>onLevelLoad</a:t>
+            </a:r>
+            <a:r>
+              <a:rPr lang="de-CH" dirty="0" smtClean="0"/>
+              <a:t> / </a:t>
+            </a:r>
+            <a:r>
+              <a:rPr lang="de-CH" dirty="0" err="1" smtClean="0"/>
+              <a:t>Disconnect</a:t>
+            </a:r>
+            <a:r>
+              <a:rPr lang="de-CH" dirty="0" smtClean="0"/>
+              <a:t> </a:t>
+            </a:r>
+            <a:r>
+              <a:rPr lang="de-CH" dirty="0" err="1" smtClean="0"/>
+              <a:t>onQuit</a:t>
+            </a:r>
+            <a:endParaRPr lang="de-CH" dirty="0" smtClean="0"/>
+          </a:p>
+          <a:p>
+            <a:r>
+              <a:rPr lang="de-CH" dirty="0" err="1" smtClean="0"/>
+              <a:t>Spawnpoints</a:t>
+            </a:r>
+            <a:endParaRPr lang="de-CH" dirty="0" smtClean="0"/>
+          </a:p>
+        </p:txBody>
+      </p:sp>
+      <p:sp>
+        <p:nvSpPr>
+          <p:cNvPr id="3" name="Titel 2"/>
+          <p:cNvSpPr>
+            <a:spLocks noGrp="1"/>
+          </p:cNvSpPr>
+          <p:nvPr>
+            <p:ph type="ctrTitle"/>
+          </p:nvPr>
+        </p:nvSpPr>
+        <p:spPr/>
+        <p:txBody>
+          <a:bodyPr/>
+          <a:lstStyle/>
+          <a:p>
+            <a:r>
+              <a:rPr lang="de-CH" dirty="0" smtClean="0"/>
+              <a:t>Multiplayer</a:t>
+            </a:r>
+            <a:endParaRPr lang="de-CH" dirty="0"/>
+          </a:p>
+        </p:txBody>
+      </p:sp>
+      <p:pic>
+        <p:nvPicPr>
+          <p:cNvPr id="1026" name="Picture 2"/>
+          <p:cNvPicPr>
+            <a:picLocks noChangeAspect="1" noChangeArrowheads="1"/>
+          </p:cNvPicPr>
+          <p:nvPr/>
+        </p:nvPicPr>
+        <p:blipFill>
+          <a:blip r:embed="rId2">
+            <a:extLst>
+              <a:ext uri="{28A0092B-C50C-407E-A947-70E740481C1C}">
+                <a14:useLocalDpi xmlns:a14="http://schemas.microsoft.com/office/drawing/2010/main" val="0"/>
+              </a:ext>
+            </a:extLst>
+          </a:blip>
+          <a:srcRect/>
+          <a:stretch>
+            <a:fillRect/>
+          </a:stretch>
+        </p:blipFill>
+        <p:spPr bwMode="auto">
+          <a:xfrm>
+            <a:off x="768348" y="2284414"/>
+            <a:ext cx="5188222" cy="2922586"/>
+          </a:xfrm>
+          <a:prstGeom prst="rect">
+            <a:avLst/>
+          </a:prstGeom>
+          <a:noFill/>
+          <a:ln w="9525">
+            <a:solidFill>
+              <a:schemeClr val="tx1"/>
+            </a:solidFill>
+            <a:miter lim="800000"/>
+            <a:headEnd/>
+            <a:tailEnd/>
+          </a:ln>
+          <a:extLst>
+            <a:ext uri="{909E8E84-426E-40DD-AFC4-6F175D3DCCD1}">
+              <a14:hiddenFill xmlns:a14="http://schemas.microsoft.com/office/drawing/2010/main">
+                <a:solidFill>
+                  <a:schemeClr val="accent1"/>
+                </a:solidFill>
+              </a14:hiddenFill>
+            </a:ext>
+          </a:extLst>
+        </p:spPr>
+      </p:pic>
+    </p:spTree>
+    <p:extLst>
+      <p:ext uri="{BB962C8B-B14F-4D97-AF65-F5344CB8AC3E}">
+        <p14:creationId xmlns:p14="http://schemas.microsoft.com/office/powerpoint/2010/main" val="1826969257"/>
+      </p:ext>
+    </p:extLst>
+  </p:cSld>
+  <p:clrMapOvr>
+    <a:masterClrMapping/>
+  </p:clrMapOvr>
+  <p:timing>
+    <p:tnLst>
+      <p:par>
+        <p:cTn id="1" dur="indefinite" restart="never" nodeType="tmRoot">
+          <p:childTnLst>
+            <p:seq concurrent="1" nextAc="seek">
+              <p:cTn id="2" dur="indefinite" nodeType="mainSeq">
+                <p:childTnLst>
+                  <p:par>
+                    <p:cTn id="3" fill="hold">
+                      <p:stCondLst>
+                        <p:cond delay="indefinite"/>
+                      </p:stCondLst>
+                      <p:childTnLst>
+                        <p:par>
+                          <p:cTn id="4" fill="hold">
+                            <p:stCondLst>
+                              <p:cond delay="0"/>
+                            </p:stCondLst>
+                            <p:childTnLst>
+                              <p:par>
+                                <p:cTn id="5" presetID="1" presetClass="entr" presetSubtype="0" fill="hold" nodeType="clickEffect">
+                                  <p:stCondLst>
+                                    <p:cond delay="0"/>
+                                  </p:stCondLst>
+                                  <p:childTnLst>
+                                    <p:set>
+                                      <p:cBhvr>
+                                        <p:cTn id="6" dur="1" fill="hold">
+                                          <p:stCondLst>
+                                            <p:cond delay="0"/>
+                                          </p:stCondLst>
+                                        </p:cTn>
+                                        <p:tgtEl>
+                                          <p:spTgt spid="2">
+                                            <p:txEl>
+                                              <p:pRg st="0" end="0"/>
+                                            </p:txEl>
+                                          </p:spTgt>
+                                        </p:tgtEl>
+                                        <p:attrNameLst>
+                                          <p:attrName>style.visibility</p:attrName>
+                                        </p:attrNameLst>
+                                      </p:cBhvr>
+                                      <p:to>
+                                        <p:strVal val="visible"/>
+                                      </p:to>
+                                    </p:set>
+                                  </p:childTnLst>
+                                </p:cTn>
+                              </p:par>
+                            </p:childTnLst>
+                          </p:cTn>
+                        </p:par>
+                      </p:childTnLst>
+                    </p:cTn>
+                  </p:par>
+                  <p:par>
+                    <p:cTn id="7" fill="hold">
+                      <p:stCondLst>
+                        <p:cond delay="indefinite"/>
+                      </p:stCondLst>
+                      <p:childTnLst>
+                        <p:par>
+                          <p:cTn id="8" fill="hold">
+                            <p:stCondLst>
+                              <p:cond delay="0"/>
+                            </p:stCondLst>
+                            <p:childTnLst>
+                              <p:par>
+                                <p:cTn id="9" presetID="1" presetClass="entr" presetSubtype="0" fill="hold" nodeType="clickEffect">
+                                  <p:stCondLst>
+                                    <p:cond delay="0"/>
+                                  </p:stCondLst>
+                                  <p:childTnLst>
+                                    <p:set>
+                                      <p:cBhvr>
+                                        <p:cTn id="10" dur="1" fill="hold">
+                                          <p:stCondLst>
+                                            <p:cond delay="0"/>
+                                          </p:stCondLst>
+                                        </p:cTn>
+                                        <p:tgtEl>
+                                          <p:spTgt spid="2">
+                                            <p:txEl>
+                                              <p:pRg st="1" end="1"/>
+                                            </p:txEl>
+                                          </p:spTgt>
+                                        </p:tgtEl>
+                                        <p:attrNameLst>
+                                          <p:attrName>style.visibility</p:attrName>
+                                        </p:attrNameLst>
+                                      </p:cBhvr>
+                                      <p:to>
+                                        <p:strVal val="visible"/>
+                                      </p:to>
+                                    </p:set>
+                                  </p:childTnLst>
+                                </p:cTn>
+                              </p:par>
+                            </p:childTnLst>
+                          </p:cTn>
+                        </p:par>
+                      </p:childTnLst>
+                    </p:cTn>
+                  </p:par>
+                  <p:par>
+                    <p:cTn id="11" fill="hold">
+                      <p:stCondLst>
+                        <p:cond delay="indefinite"/>
+                      </p:stCondLst>
+                      <p:childTnLst>
+                        <p:par>
+                          <p:cTn id="12" fill="hold">
+                            <p:stCondLst>
+                              <p:cond delay="0"/>
+                            </p:stCondLst>
+                            <p:childTnLst>
+                              <p:par>
+                                <p:cTn id="13" presetID="1" presetClass="entr" presetSubtype="0" fill="hold" nodeType="clickEffect">
+                                  <p:stCondLst>
+                                    <p:cond delay="0"/>
+                                  </p:stCondLst>
+                                  <p:childTnLst>
+                                    <p:set>
+                                      <p:cBhvr>
+                                        <p:cTn id="14" dur="1" fill="hold">
+                                          <p:stCondLst>
+                                            <p:cond delay="0"/>
+                                          </p:stCondLst>
+                                        </p:cTn>
+                                        <p:tgtEl>
+                                          <p:spTgt spid="1026"/>
+                                        </p:tgtEl>
+                                        <p:attrNameLst>
+                                          <p:attrName>style.visibility</p:attrName>
+                                        </p:attrNameLst>
+                                      </p:cBhvr>
+                                      <p:to>
+                                        <p:strVal val="visible"/>
+                                      </p:to>
+                                    </p:set>
+                                  </p:childTnLst>
+                                </p:cTn>
+                              </p:par>
+                            </p:childTnLst>
+                          </p:cTn>
+                        </p:par>
+                      </p:childTnLst>
+                    </p:cTn>
+                  </p:par>
+                </p:childTnLst>
+              </p:cTn>
+              <p:prevCondLst>
+                <p:cond evt="onPrev" delay="0">
+                  <p:tgtEl>
+                    <p:sldTgt/>
+                  </p:tgtEl>
+                </p:cond>
+              </p:prevCondLst>
+              <p:nextCondLst>
+                <p:cond evt="onNext" delay="0">
+                  <p:tgtEl>
+                    <p:sldTgt/>
+                  </p:tgtEl>
+                </p:cond>
+              </p:nextCondLst>
+            </p:seq>
+          </p:childTnLst>
+        </p:cTn>
+      </p:par>
+    </p:tnLst>
+  </p:timing>
+</p:sld>
+</file>
+
+<file path=ppt/slides/slide4.xml><?xml version="1.0" encoding="utf-8"?>
+<p:sld xmlns:a="http://schemas.openxmlformats.org/drawingml/2006/main" xmlns:r="http://schemas.openxmlformats.org/officeDocument/2006/relationships" xmlns:p="http://schemas.openxmlformats.org/presentationml/2006/main">
+  <p:cSld>
+    <p:spTree>
+      <p:nvGrpSpPr>
+        <p:cNvPr id="1" name=""/>
+        <p:cNvGrpSpPr/>
+        <p:nvPr/>
+      </p:nvGrpSpPr>
+      <p:grpSpPr>
+        <a:xfrm>
+          <a:off x="0" y="0"/>
+          <a:ext cx="0" cy="0"/>
+          <a:chOff x="0" y="0"/>
+          <a:chExt cx="0" cy="0"/>
+        </a:xfrm>
+      </p:grpSpPr>
+      <p:sp>
+        <p:nvSpPr>
+          <p:cNvPr id="2" name="Inhaltsplatzhalter 1"/>
+          <p:cNvSpPr>
+            <a:spLocks noGrp="1"/>
+          </p:cNvSpPr>
+          <p:nvPr>
+            <p:ph sz="half" idx="1"/>
+          </p:nvPr>
+        </p:nvSpPr>
+        <p:spPr/>
+        <p:txBody>
+          <a:bodyPr/>
+          <a:lstStyle/>
+          <a:p>
+            <a:r>
+              <a:rPr lang="de-CH" dirty="0" smtClean="0"/>
+              <a:t>Synchronisation</a:t>
+            </a:r>
+            <a:endParaRPr lang="de-CH" dirty="0"/>
+          </a:p>
+        </p:txBody>
+      </p:sp>
+      <p:sp>
+        <p:nvSpPr>
+          <p:cNvPr id="3" name="Titel 2"/>
+          <p:cNvSpPr>
+            <a:spLocks noGrp="1"/>
+          </p:cNvSpPr>
+          <p:nvPr>
+            <p:ph type="ctrTitle"/>
+          </p:nvPr>
+        </p:nvSpPr>
+        <p:spPr/>
+        <p:txBody>
+          <a:bodyPr/>
+          <a:lstStyle/>
+          <a:p>
+            <a:r>
+              <a:rPr lang="de-CH" dirty="0" smtClean="0"/>
+              <a:t>Multiplayer</a:t>
+            </a:r>
+            <a:endParaRPr lang="de-CH" dirty="0"/>
+          </a:p>
+        </p:txBody>
+      </p:sp>
+      <p:pic>
+        <p:nvPicPr>
+          <p:cNvPr id="2050" name="Picture 2"/>
+          <p:cNvPicPr>
+            <a:picLocks noChangeAspect="1" noChangeArrowheads="1"/>
+          </p:cNvPicPr>
+          <p:nvPr/>
+        </p:nvPicPr>
+        <p:blipFill>
+          <a:blip r:embed="rId2">
+            <a:extLst>
+              <a:ext uri="{28A0092B-C50C-407E-A947-70E740481C1C}">
+                <a14:useLocalDpi xmlns:a14="http://schemas.microsoft.com/office/drawing/2010/main" val="0"/>
+              </a:ext>
+            </a:extLst>
+          </a:blip>
+          <a:srcRect/>
+          <a:stretch>
+            <a:fillRect/>
+          </a:stretch>
+        </p:blipFill>
+        <p:spPr bwMode="auto">
+          <a:xfrm>
+            <a:off x="2400878" y="2261128"/>
+            <a:ext cx="5634037" cy="3447431"/>
+          </a:xfrm>
+          <a:prstGeom prst="rect">
+            <a:avLst/>
+          </a:prstGeom>
+          <a:noFill/>
+          <a:ln>
+            <a:noFill/>
+          </a:ln>
+          <a:extLst>
+            <a:ext uri="{909E8E84-426E-40DD-AFC4-6F175D3DCCD1}">
+              <a14:hiddenFill xmlns:a14="http://schemas.microsoft.com/office/drawing/2010/main">
+                <a:solidFill>
+                  <a:schemeClr val="accent1"/>
+                </a:solidFill>
+              </a14:hiddenFill>
+            </a:ext>
+            <a:ext uri="{91240B29-F687-4F45-9708-019B960494DF}">
+              <a14:hiddenLine xmlns:a14="http://schemas.microsoft.com/office/drawing/2010/main" w="9525">
+                <a:solidFill>
+                  <a:schemeClr val="tx1"/>
+                </a:solidFill>
+                <a:miter lim="800000"/>
+                <a:headEnd/>
+                <a:tailEnd/>
+              </a14:hiddenLine>
+            </a:ext>
+          </a:extLst>
+        </p:spPr>
+      </p:pic>
+      <p:sp>
+        <p:nvSpPr>
+          <p:cNvPr id="4" name="Textfeld 3"/>
+          <p:cNvSpPr txBox="1"/>
+          <p:nvPr/>
+        </p:nvSpPr>
+        <p:spPr>
+          <a:xfrm>
+            <a:off x="846666" y="3599954"/>
+            <a:ext cx="1656223" cy="246221"/>
+          </a:xfrm>
+          <a:prstGeom prst="rect">
+            <a:avLst/>
+          </a:prstGeom>
+          <a:noFill/>
+        </p:spPr>
+        <p:txBody>
+          <a:bodyPr wrap="none" rtlCol="0">
+            <a:spAutoFit/>
+          </a:bodyPr>
+          <a:lstStyle/>
+          <a:p>
+            <a:r>
+              <a:rPr lang="de-CH" sz="1000" dirty="0" smtClean="0">
+                <a:latin typeface="Lucida Sans"/>
+                <a:cs typeface="Lucida Sans"/>
+              </a:rPr>
+              <a:t>Erstellung </a:t>
+            </a:r>
+            <a:r>
+              <a:rPr lang="de-CH" sz="1000" dirty="0" err="1" smtClean="0">
+                <a:latin typeface="Lucida Sans"/>
+                <a:cs typeface="Lucida Sans"/>
+              </a:rPr>
+              <a:t>Synchronizer</a:t>
+            </a:r>
+            <a:endParaRPr lang="de-CH" sz="1000" dirty="0">
+              <a:latin typeface="Lucida Sans"/>
+              <a:cs typeface="Lucida Sans"/>
+            </a:endParaRPr>
+          </a:p>
+        </p:txBody>
+      </p:sp>
+      <p:sp>
+        <p:nvSpPr>
+          <p:cNvPr id="6" name="Textfeld 5"/>
+          <p:cNvSpPr txBox="1"/>
+          <p:nvPr/>
+        </p:nvSpPr>
+        <p:spPr>
+          <a:xfrm>
+            <a:off x="846666" y="4091021"/>
+            <a:ext cx="1406154" cy="246221"/>
+          </a:xfrm>
+          <a:prstGeom prst="rect">
+            <a:avLst/>
+          </a:prstGeom>
+          <a:noFill/>
+        </p:spPr>
+        <p:txBody>
+          <a:bodyPr wrap="none" rtlCol="0">
+            <a:spAutoFit/>
+          </a:bodyPr>
+          <a:lstStyle/>
+          <a:p>
+            <a:r>
+              <a:rPr lang="de-CH" sz="1000" dirty="0" smtClean="0">
+                <a:latin typeface="Lucida Sans"/>
+                <a:cs typeface="Lucida Sans"/>
+              </a:rPr>
+              <a:t>Scripts deaktivieren</a:t>
+            </a:r>
+            <a:endParaRPr lang="de-CH" sz="1000" dirty="0">
+              <a:latin typeface="Lucida Sans"/>
+              <a:cs typeface="Lucida Sans"/>
+            </a:endParaRPr>
+          </a:p>
+        </p:txBody>
+      </p:sp>
+      <p:sp>
+        <p:nvSpPr>
+          <p:cNvPr id="7" name="Textfeld 6"/>
+          <p:cNvSpPr txBox="1"/>
+          <p:nvPr/>
+        </p:nvSpPr>
+        <p:spPr>
+          <a:xfrm>
+            <a:off x="846666" y="4488951"/>
+            <a:ext cx="1717137" cy="400110"/>
+          </a:xfrm>
+          <a:prstGeom prst="rect">
+            <a:avLst/>
+          </a:prstGeom>
+          <a:noFill/>
+        </p:spPr>
+        <p:txBody>
+          <a:bodyPr wrap="none" rtlCol="0">
+            <a:spAutoFit/>
+          </a:bodyPr>
+          <a:lstStyle/>
+          <a:p>
+            <a:r>
+              <a:rPr lang="de-CH" sz="1000" dirty="0" smtClean="0">
+                <a:latin typeface="Lucida Sans"/>
+                <a:cs typeface="Lucida Sans"/>
+              </a:rPr>
+              <a:t>Positionen  &amp; Rotationen</a:t>
+            </a:r>
+          </a:p>
+          <a:p>
+            <a:r>
+              <a:rPr lang="de-CH" sz="1000" dirty="0" smtClean="0">
+                <a:latin typeface="Lucida Sans"/>
+                <a:cs typeface="Lucida Sans"/>
+              </a:rPr>
+              <a:t>interpolieren</a:t>
+            </a:r>
+            <a:endParaRPr lang="de-CH" sz="1000" dirty="0">
+              <a:latin typeface="Lucida Sans"/>
+              <a:cs typeface="Lucida Sans"/>
+            </a:endParaRPr>
+          </a:p>
+        </p:txBody>
+      </p:sp>
+      <p:sp>
+        <p:nvSpPr>
+          <p:cNvPr id="8" name="Textfeld 7"/>
+          <p:cNvSpPr txBox="1"/>
+          <p:nvPr/>
+        </p:nvSpPr>
+        <p:spPr>
+          <a:xfrm>
+            <a:off x="846666" y="4924545"/>
+            <a:ext cx="1042273" cy="246221"/>
+          </a:xfrm>
+          <a:prstGeom prst="rect">
+            <a:avLst/>
+          </a:prstGeom>
+          <a:noFill/>
+        </p:spPr>
+        <p:txBody>
+          <a:bodyPr wrap="none" rtlCol="0">
+            <a:spAutoFit/>
+          </a:bodyPr>
+          <a:lstStyle/>
+          <a:p>
+            <a:r>
+              <a:rPr lang="de-CH" sz="1000" dirty="0" smtClean="0">
+                <a:latin typeface="Lucida Sans"/>
+                <a:cs typeface="Lucida Sans"/>
+              </a:rPr>
+              <a:t>Daten senden</a:t>
+            </a:r>
+            <a:endParaRPr lang="de-CH" sz="1000" dirty="0">
+              <a:latin typeface="Lucida Sans"/>
+              <a:cs typeface="Lucida Sans"/>
+            </a:endParaRPr>
+          </a:p>
+        </p:txBody>
+      </p:sp>
+      <p:sp>
+        <p:nvSpPr>
+          <p:cNvPr id="9" name="Textfeld 8"/>
+          <p:cNvSpPr txBox="1"/>
+          <p:nvPr/>
+        </p:nvSpPr>
+        <p:spPr>
+          <a:xfrm>
+            <a:off x="846666" y="5214717"/>
+            <a:ext cx="1293944" cy="246221"/>
+          </a:xfrm>
+          <a:prstGeom prst="rect">
+            <a:avLst/>
+          </a:prstGeom>
+          <a:noFill/>
+        </p:spPr>
+        <p:txBody>
+          <a:bodyPr wrap="none" rtlCol="0">
+            <a:spAutoFit/>
+          </a:bodyPr>
+          <a:lstStyle/>
+          <a:p>
+            <a:r>
+              <a:rPr lang="de-CH" sz="1000" dirty="0" smtClean="0">
+                <a:latin typeface="Lucida Sans"/>
+                <a:cs typeface="Lucida Sans"/>
+              </a:rPr>
+              <a:t>Daten empfangen</a:t>
+            </a:r>
+            <a:endParaRPr lang="de-CH" sz="1000" dirty="0">
+              <a:latin typeface="Lucida Sans"/>
+              <a:cs typeface="Lucida Sans"/>
+            </a:endParaRPr>
+          </a:p>
+        </p:txBody>
+      </p:sp>
+    </p:spTree>
+    <p:extLst>
+      <p:ext uri="{BB962C8B-B14F-4D97-AF65-F5344CB8AC3E}">
+        <p14:creationId xmlns:p14="http://schemas.microsoft.com/office/powerpoint/2010/main" val="2216512755"/>
+      </p:ext>
+    </p:extLst>
+  </p:cSld>
+  <p:clrMapOvr>
+    <a:masterClrMapping/>
+  </p:clrMapOvr>
+  <p:timing>
+    <p:tnLst>
+      <p:par>
+        <p:cTn id="1" dur="indefinite" restart="never" nodeType="tmRoot">
+          <p:childTnLst>
+            <p:seq concurrent="1" nextAc="seek">
+              <p:cTn id="2" dur="indefinite" nodeType="mainSeq">
+                <p:childTnLst>
+                  <p:par>
+                    <p:cTn id="3" fill="hold">
+                      <p:stCondLst>
+                        <p:cond delay="indefinite"/>
+                      </p:stCondLst>
+                      <p:childTnLst>
+                        <p:par>
+                          <p:cTn id="4" fill="hold">
+                            <p:stCondLst>
+                              <p:cond delay="0"/>
+                            </p:stCondLst>
+                            <p:childTnLst>
+                              <p:par>
+                                <p:cTn id="5" presetID="1" presetClass="entr" presetSubtype="0" fill="hold" grpId="0" nodeType="clickEffect">
+                                  <p:stCondLst>
+                                    <p:cond delay="0"/>
+                                  </p:stCondLst>
+                                  <p:childTnLst>
+                                    <p:set>
+                                      <p:cBhvr>
+                                        <p:cTn id="6" dur="1" fill="hold">
+                                          <p:stCondLst>
+                                            <p:cond delay="0"/>
+                                          </p:stCondLst>
+                                        </p:cTn>
+                                        <p:tgtEl>
+                                          <p:spTgt spid="4"/>
+                                        </p:tgtEl>
+                                        <p:attrNameLst>
+                                          <p:attrName>style.visibility</p:attrName>
+                                        </p:attrNameLst>
+                                      </p:cBhvr>
+                                      <p:to>
+                                        <p:strVal val="visible"/>
+                                      </p:to>
+                                    </p:set>
+                                  </p:childTnLst>
+                                </p:cTn>
+                              </p:par>
+                            </p:childTnLst>
+                          </p:cTn>
+                        </p:par>
+                      </p:childTnLst>
+                    </p:cTn>
+                  </p:par>
+                  <p:par>
+                    <p:cTn id="7" fill="hold">
+                      <p:stCondLst>
+                        <p:cond delay="indefinite"/>
+                      </p:stCondLst>
+                      <p:childTnLst>
+                        <p:par>
+                          <p:cTn id="8" fill="hold">
+                            <p:stCondLst>
+                              <p:cond delay="0"/>
+                            </p:stCondLst>
+                            <p:childTnLst>
+                              <p:par>
+                                <p:cTn id="9" presetID="1" presetClass="entr" presetSubtype="0" fill="hold" grpId="0" nodeType="clickEffect">
+                                  <p:stCondLst>
+                                    <p:cond delay="0"/>
+                                  </p:stCondLst>
+                                  <p:childTnLst>
+                                    <p:set>
+                                      <p:cBhvr>
+                                        <p:cTn id="10" dur="1" fill="hold">
+                                          <p:stCondLst>
+                                            <p:cond delay="0"/>
+                                          </p:stCondLst>
+                                        </p:cTn>
+                                        <p:tgtEl>
+                                          <p:spTgt spid="6"/>
+                                        </p:tgtEl>
+                                        <p:attrNameLst>
+                                          <p:attrName>style.visibility</p:attrName>
+                                        </p:attrNameLst>
+                                      </p:cBhvr>
+                                      <p:to>
+                                        <p:strVal val="visible"/>
+                                      </p:to>
+                                    </p:set>
+                                  </p:childTnLst>
+                                </p:cTn>
+                              </p:par>
+                            </p:childTnLst>
+                          </p:cTn>
+                        </p:par>
+                      </p:childTnLst>
+                    </p:cTn>
+                  </p:par>
+                  <p:par>
+                    <p:cTn id="11" fill="hold">
+                      <p:stCondLst>
+                        <p:cond delay="indefinite"/>
+                      </p:stCondLst>
+                      <p:childTnLst>
+                        <p:par>
+                          <p:cTn id="12" fill="hold">
+                            <p:stCondLst>
+                              <p:cond delay="0"/>
+                            </p:stCondLst>
+                            <p:childTnLst>
+                              <p:par>
+                                <p:cTn id="13" presetID="1" presetClass="entr" presetSubtype="0" fill="hold" grpId="0" nodeType="clickEffect">
+                                  <p:stCondLst>
+                                    <p:cond delay="0"/>
+                                  </p:stCondLst>
+                                  <p:childTnLst>
+                                    <p:set>
+                                      <p:cBhvr>
+                                        <p:cTn id="14" dur="1" fill="hold">
+                                          <p:stCondLst>
+                                            <p:cond delay="0"/>
+                                          </p:stCondLst>
+                                        </p:cTn>
+                                        <p:tgtEl>
+                                          <p:spTgt spid="7"/>
+                                        </p:tgtEl>
+                                        <p:attrNameLst>
+                                          <p:attrName>style.visibility</p:attrName>
+                                        </p:attrNameLst>
+                                      </p:cBhvr>
+                                      <p:to>
+                                        <p:strVal val="visible"/>
+                                      </p:to>
+                                    </p:set>
+                                  </p:childTnLst>
+                                </p:cTn>
+                              </p:par>
+                            </p:childTnLst>
+                          </p:cTn>
+                        </p:par>
+                      </p:childTnLst>
+                    </p:cTn>
+                  </p:par>
+                  <p:par>
+                    <p:cTn id="15" fill="hold">
+                      <p:stCondLst>
+                        <p:cond delay="indefinite"/>
+                      </p:stCondLst>
+                      <p:childTnLst>
+                        <p:par>
+                          <p:cTn id="16" fill="hold">
+                            <p:stCondLst>
+                              <p:cond delay="0"/>
+                            </p:stCondLst>
+                            <p:childTnLst>
+                              <p:par>
+                                <p:cTn id="17" presetID="1" presetClass="entr" presetSubtype="0" fill="hold" grpId="0" nodeType="clickEffect">
+                                  <p:stCondLst>
+                                    <p:cond delay="0"/>
+                                  </p:stCondLst>
+                                  <p:childTnLst>
+                                    <p:set>
+                                      <p:cBhvr>
+                                        <p:cTn id="18" dur="1" fill="hold">
+                                          <p:stCondLst>
+                                            <p:cond delay="0"/>
+                                          </p:stCondLst>
+                                        </p:cTn>
+                                        <p:tgtEl>
+                                          <p:spTgt spid="8"/>
+                                        </p:tgtEl>
+                                        <p:attrNameLst>
+                                          <p:attrName>style.visibility</p:attrName>
+                                        </p:attrNameLst>
+                                      </p:cBhvr>
+                                      <p:to>
+                                        <p:strVal val="visible"/>
+                                      </p:to>
+                                    </p:set>
+                                  </p:childTnLst>
+                                </p:cTn>
+                              </p:par>
+                            </p:childTnLst>
+                          </p:cTn>
+                        </p:par>
+                      </p:childTnLst>
+                    </p:cTn>
+                  </p:par>
+                  <p:par>
+                    <p:cTn id="19" fill="hold">
+                      <p:stCondLst>
+                        <p:cond delay="indefinite"/>
+                      </p:stCondLst>
+                      <p:childTnLst>
+                        <p:par>
+                          <p:cTn id="20" fill="hold">
+                            <p:stCondLst>
+                              <p:cond delay="0"/>
+                            </p:stCondLst>
+                            <p:childTnLst>
+                              <p:par>
+                                <p:cTn id="21" presetID="1" presetClass="entr" presetSubtype="0" fill="hold" grpId="0" nodeType="clickEffect">
+                                  <p:stCondLst>
+                                    <p:cond delay="0"/>
+                                  </p:stCondLst>
+                                  <p:childTnLst>
+                                    <p:set>
+                                      <p:cBhvr>
+                                        <p:cTn id="22" dur="1" fill="hold">
+                                          <p:stCondLst>
+                                            <p:cond delay="0"/>
+                                          </p:stCondLst>
+                                        </p:cTn>
+                                        <p:tgtEl>
+                                          <p:spTgt spid="9"/>
+                                        </p:tgtEl>
+                                        <p:attrNameLst>
+                                          <p:attrName>style.visibility</p:attrName>
+                                        </p:attrNameLst>
+                                      </p:cBhvr>
+                                      <p:to>
+                                        <p:strVal val="visible"/>
+                                      </p:to>
+                                    </p:set>
+                                  </p:childTnLst>
+                                </p:cTn>
+                              </p:par>
+                            </p:childTnLst>
+                          </p:cTn>
+                        </p:par>
+                      </p:childTnLst>
+                    </p:cTn>
+                  </p:par>
+                </p:childTnLst>
+              </p:cTn>
+              <p:prevCondLst>
+                <p:cond evt="onPrev" delay="0">
+                  <p:tgtEl>
+                    <p:sldTgt/>
+                  </p:tgtEl>
+                </p:cond>
+              </p:prevCondLst>
+              <p:nextCondLst>
+                <p:cond evt="onNext" delay="0">
+                  <p:tgtEl>
+                    <p:sldTgt/>
+                  </p:tgtEl>
+                </p:cond>
+              </p:nextCondLst>
+            </p:seq>
+          </p:childTnLst>
+        </p:cTn>
+      </p:par>
+    </p:tnLst>
+    <p:bldLst>
+      <p:bldP spid="4" grpId="0"/>
+      <p:bldP spid="6" grpId="0"/>
+      <p:bldP spid="7" grpId="0"/>
+      <p:bldP spid="8" grpId="0"/>
+      <p:bldP spid="9" grpId="0"/>
+    </p:bldLst>
+  </p:timing>
+</p:sld>
+</file>
+
+<file path=ppt/slides/slide5.xml><?xml version="1.0" encoding="utf-8"?>
+<p:sld xmlns:a="http://schemas.openxmlformats.org/drawingml/2006/main" xmlns:r="http://schemas.openxmlformats.org/officeDocument/2006/relationships" xmlns:p="http://schemas.openxmlformats.org/presentationml/2006/main">
+  <p:cSld>
+    <p:spTree>
+      <p:nvGrpSpPr>
+        <p:cNvPr id="1" name=""/>
+        <p:cNvGrpSpPr/>
+        <p:nvPr/>
+      </p:nvGrpSpPr>
+      <p:grpSpPr>
+        <a:xfrm>
+          <a:off x="0" y="0"/>
+          <a:ext cx="0" cy="0"/>
+          <a:chOff x="0" y="0"/>
+          <a:chExt cx="0" cy="0"/>
+        </a:xfrm>
+      </p:grpSpPr>
+      <p:sp>
+        <p:nvSpPr>
+          <p:cNvPr id="2" name="Inhaltsplatzhalter 1"/>
+          <p:cNvSpPr>
+            <a:spLocks noGrp="1"/>
+          </p:cNvSpPr>
+          <p:nvPr>
+            <p:ph sz="half" idx="1"/>
+          </p:nvPr>
+        </p:nvSpPr>
+        <p:spPr/>
+        <p:txBody>
+          <a:bodyPr/>
+          <a:lstStyle/>
+          <a:p>
+            <a:r>
+              <a:rPr lang="de-CH" dirty="0" err="1" smtClean="0"/>
+              <a:t>Prefab</a:t>
+            </a:r>
+            <a:r>
+              <a:rPr lang="de-CH" dirty="0" smtClean="0"/>
+              <a:t> (</a:t>
+            </a:r>
+            <a:r>
+              <a:rPr lang="de-CH" dirty="0" err="1" smtClean="0"/>
+              <a:t>Rigidbody</a:t>
+            </a:r>
+            <a:r>
+              <a:rPr lang="de-CH" dirty="0" smtClean="0"/>
+              <a:t>) instanziieren</a:t>
+            </a:r>
+          </a:p>
+          <a:p>
+            <a:r>
+              <a:rPr lang="de-CH" dirty="0" smtClean="0"/>
+              <a:t>Position von </a:t>
+            </a:r>
+            <a:r>
+              <a:rPr lang="de-CH" dirty="0" err="1" smtClean="0"/>
+              <a:t>Turret</a:t>
+            </a:r>
+            <a:r>
+              <a:rPr lang="de-CH" dirty="0" smtClean="0"/>
+              <a:t> übernehmen</a:t>
+            </a:r>
+          </a:p>
+          <a:p>
+            <a:r>
+              <a:rPr lang="de-CH" dirty="0" smtClean="0"/>
+              <a:t>Force hinzufügen</a:t>
+            </a:r>
+          </a:p>
+          <a:p>
+            <a:r>
+              <a:rPr lang="de-CH" dirty="0" smtClean="0"/>
+              <a:t>Sound abspielen</a:t>
+            </a:r>
+          </a:p>
+          <a:p>
+            <a:r>
+              <a:rPr lang="de-CH" dirty="0" smtClean="0"/>
+              <a:t>Nach Timeout </a:t>
+            </a:r>
+            <a:r>
+              <a:rPr lang="de-CH" dirty="0" err="1" smtClean="0"/>
+              <a:t>GameObject</a:t>
+            </a:r>
+            <a:r>
+              <a:rPr lang="de-CH" dirty="0" smtClean="0"/>
+              <a:t> zerstören</a:t>
+            </a:r>
+          </a:p>
+          <a:p>
+            <a:pPr lvl="1"/>
+            <a:endParaRPr lang="de-CH" dirty="0"/>
+          </a:p>
+          <a:p>
+            <a:endParaRPr lang="de-CH" dirty="0" smtClean="0"/>
+          </a:p>
+          <a:p>
+            <a:endParaRPr lang="de-CH" dirty="0"/>
+          </a:p>
+          <a:p>
+            <a:endParaRPr lang="de-CH" dirty="0" smtClean="0"/>
+          </a:p>
+          <a:p>
+            <a:pPr marL="457200" lvl="1" indent="0">
+              <a:buNone/>
+            </a:pPr>
+            <a:endParaRPr lang="de-CH" dirty="0" smtClean="0"/>
+          </a:p>
+          <a:p>
+            <a:endParaRPr lang="de-CH" dirty="0" smtClean="0"/>
+          </a:p>
+          <a:p>
+            <a:endParaRPr lang="de-CH" dirty="0"/>
+          </a:p>
+        </p:txBody>
+      </p:sp>
+      <p:sp>
+        <p:nvSpPr>
+          <p:cNvPr id="3" name="Titel 2"/>
+          <p:cNvSpPr>
+            <a:spLocks noGrp="1"/>
+          </p:cNvSpPr>
+          <p:nvPr>
+            <p:ph type="ctrTitle"/>
+          </p:nvPr>
+        </p:nvSpPr>
+        <p:spPr/>
+        <p:txBody>
+          <a:bodyPr/>
+          <a:lstStyle/>
+          <a:p>
+            <a:r>
+              <a:rPr lang="de-CH" dirty="0" err="1" smtClean="0"/>
+              <a:t>Rockets</a:t>
+            </a:r>
+            <a:endParaRPr lang="de-CH" dirty="0"/>
+          </a:p>
+        </p:txBody>
+      </p:sp>
+      <p:pic>
+        <p:nvPicPr>
+          <p:cNvPr id="5" name="Grafik 4"/>
+          <p:cNvPicPr>
+            <a:picLocks noChangeAspect="1"/>
+          </p:cNvPicPr>
+          <p:nvPr/>
+        </p:nvPicPr>
+        <p:blipFill>
+          <a:blip r:embed="rId2">
+            <a:extLst>
+              <a:ext uri="{28A0092B-C50C-407E-A947-70E740481C1C}">
+                <a14:useLocalDpi xmlns:a14="http://schemas.microsoft.com/office/drawing/2010/main" val="0"/>
+              </a:ext>
+            </a:extLst>
+          </a:blip>
+          <a:stretch>
+            <a:fillRect/>
+          </a:stretch>
+        </p:blipFill>
+        <p:spPr>
+          <a:xfrm>
+            <a:off x="6087118" y="560512"/>
+            <a:ext cx="2041539" cy="1758973"/>
+          </a:xfrm>
+          <a:prstGeom prst="rect">
+            <a:avLst/>
+          </a:prstGeom>
+        </p:spPr>
+      </p:pic>
+    </p:spTree>
+    <p:extLst>
+      <p:ext uri="{BB962C8B-B14F-4D97-AF65-F5344CB8AC3E}">
+        <p14:creationId xmlns:p14="http://schemas.microsoft.com/office/powerpoint/2010/main" val="4210151505"/>
+      </p:ext>
+    </p:extLst>
+  </p:cSld>
+  <p:clrMapOvr>
+    <a:masterClrMapping/>
+  </p:clrMapOvr>
+  <p:timing>
+    <p:tnLst>
+      <p:par>
+        <p:cTn id="1" dur="indefinite" restart="never" nodeType="tmRoot"/>
+      </p:par>
+    </p:tnLst>
+  </p:timing>
+</p:sld>
+</file>
+
+<file path=ppt/slides/slide6.xml><?xml version="1.0" encoding="utf-8"?>
+<p:sld xmlns:a="http://schemas.openxmlformats.org/drawingml/2006/main" xmlns:r="http://schemas.openxmlformats.org/officeDocument/2006/relationships" xmlns:p="http://schemas.openxmlformats.org/presentationml/2006/main">
+  <p:cSld>
+    <p:spTree>
+      <p:nvGrpSpPr>
+        <p:cNvPr id="1" name=""/>
+        <p:cNvGrpSpPr/>
+        <p:nvPr/>
+      </p:nvGrpSpPr>
+      <p:grpSpPr>
+        <a:xfrm>
+          <a:off x="0" y="0"/>
+          <a:ext cx="0" cy="0"/>
+          <a:chOff x="0" y="0"/>
+          <a:chExt cx="0" cy="0"/>
+        </a:xfrm>
+      </p:grpSpPr>
+      <p:sp>
+        <p:nvSpPr>
+          <p:cNvPr id="2" name="Inhaltsplatzhalter 1"/>
+          <p:cNvSpPr>
+            <a:spLocks noGrp="1"/>
+          </p:cNvSpPr>
+          <p:nvPr>
+            <p:ph sz="half" idx="1"/>
+          </p:nvPr>
+        </p:nvSpPr>
+        <p:spPr/>
+        <p:txBody>
+          <a:bodyPr/>
+          <a:lstStyle/>
+          <a:p>
+            <a:r>
+              <a:rPr lang="de-CH" dirty="0" smtClean="0"/>
+              <a:t>Gleichzeitig Explosion (Partikelsystem) instanziieren</a:t>
+            </a:r>
+            <a:endParaRPr lang="de-CH" dirty="0"/>
+          </a:p>
+          <a:p>
+            <a:r>
+              <a:rPr lang="de-CH" dirty="0"/>
+              <a:t>Zufälliger Sound </a:t>
+            </a:r>
+            <a:r>
+              <a:rPr lang="de-CH" dirty="0" smtClean="0"/>
+              <a:t>abspielen</a:t>
+            </a:r>
+          </a:p>
+          <a:p>
+            <a:r>
+              <a:rPr lang="de-CH" dirty="0" err="1" smtClean="0"/>
+              <a:t>ExplosionForce</a:t>
+            </a:r>
+            <a:r>
+              <a:rPr lang="de-CH" dirty="0" smtClean="0"/>
+              <a:t> für nahe </a:t>
+            </a:r>
+            <a:r>
+              <a:rPr lang="de-CH" dirty="0" err="1" smtClean="0"/>
+              <a:t>Rigidbodies</a:t>
+            </a:r>
+            <a:endParaRPr lang="de-CH" dirty="0" smtClean="0"/>
+          </a:p>
+          <a:p>
+            <a:endParaRPr lang="de-CH" dirty="0"/>
+          </a:p>
+          <a:p>
+            <a:endParaRPr lang="en-US" dirty="0"/>
+          </a:p>
+        </p:txBody>
+      </p:sp>
+      <p:sp>
+        <p:nvSpPr>
+          <p:cNvPr id="3" name="Titel 2"/>
+          <p:cNvSpPr>
+            <a:spLocks noGrp="1"/>
+          </p:cNvSpPr>
+          <p:nvPr>
+            <p:ph type="ctrTitle"/>
+          </p:nvPr>
+        </p:nvSpPr>
+        <p:spPr/>
+        <p:txBody>
+          <a:bodyPr/>
+          <a:lstStyle/>
+          <a:p>
+            <a:r>
+              <a:rPr lang="de-CH" dirty="0" err="1" smtClean="0"/>
+              <a:t>Rockets</a:t>
+            </a:r>
+            <a:endParaRPr lang="en-US" dirty="0"/>
+          </a:p>
+        </p:txBody>
+      </p:sp>
+      <p:pic>
+        <p:nvPicPr>
+          <p:cNvPr id="4" name="Grafik 3"/>
+          <p:cNvPicPr>
+            <a:picLocks noChangeAspect="1"/>
+          </p:cNvPicPr>
+          <p:nvPr/>
+        </p:nvPicPr>
+        <p:blipFill>
+          <a:blip r:embed="rId3">
+            <a:extLst>
+              <a:ext uri="{28A0092B-C50C-407E-A947-70E740481C1C}">
+                <a14:useLocalDpi xmlns:a14="http://schemas.microsoft.com/office/drawing/2010/main" val="0"/>
+              </a:ext>
+            </a:extLst>
+          </a:blip>
+          <a:stretch>
+            <a:fillRect/>
+          </a:stretch>
+        </p:blipFill>
+        <p:spPr>
+          <a:xfrm>
+            <a:off x="797513" y="3678862"/>
+            <a:ext cx="3395546" cy="2017280"/>
+          </a:xfrm>
+          <a:prstGeom prst="rect">
+            <a:avLst/>
+          </a:prstGeom>
+        </p:spPr>
+      </p:pic>
+    </p:spTree>
+    <p:extLst>
+      <p:ext uri="{BB962C8B-B14F-4D97-AF65-F5344CB8AC3E}">
+        <p14:creationId xmlns:p14="http://schemas.microsoft.com/office/powerpoint/2010/main" val="1597542597"/>
+      </p:ext>
+    </p:extLst>
+  </p:cSld>
+  <p:clrMapOvr>
+    <a:masterClrMapping/>
+  </p:clrMapOvr>
+  <p:timing>
+    <p:tnLst>
+      <p:par>
+        <p:cTn id="1" dur="indefinite" restart="never" nodeType="tmRoot"/>
+      </p:par>
+    </p:tnLst>
+  </p:timing>
+</p:sld>
+</file>
+
+<file path=ppt/slides/slide7.xml><?xml version="1.0" encoding="utf-8"?>
+<p:sld xmlns:a="http://schemas.openxmlformats.org/drawingml/2006/main" xmlns:r="http://schemas.openxmlformats.org/officeDocument/2006/relationships" xmlns:p="http://schemas.openxmlformats.org/presentationml/2006/main">
+  <p:cSld>
+    <p:spTree>
+      <p:nvGrpSpPr>
+        <p:cNvPr id="1" name=""/>
+        <p:cNvGrpSpPr/>
+        <p:nvPr/>
+      </p:nvGrpSpPr>
+      <p:grpSpPr>
+        <a:xfrm>
+          <a:off x="0" y="0"/>
+          <a:ext cx="0" cy="0"/>
+          <a:chOff x="0" y="0"/>
+          <a:chExt cx="0" cy="0"/>
+        </a:xfrm>
+      </p:grpSpPr>
+      <p:sp>
+        <p:nvSpPr>
+          <p:cNvPr id="2" name="Inhaltsplatzhalter 1"/>
+          <p:cNvSpPr>
+            <a:spLocks noGrp="1"/>
+          </p:cNvSpPr>
+          <p:nvPr>
+            <p:ph sz="half" idx="1"/>
+          </p:nvPr>
+        </p:nvSpPr>
+        <p:spPr/>
+        <p:txBody>
+          <a:bodyPr/>
+          <a:lstStyle/>
+          <a:p>
+            <a:r>
+              <a:rPr lang="de-CH" dirty="0" smtClean="0"/>
               <a:t>Punkteberechnung nach Treffer</a:t>
             </a:r>
           </a:p>
@@ -7322,11 +8679,11 @@
   <p:clrMapOvr>
     <a:masterClrMapping/>
   </p:clrMapOvr>
-  <mc:AlternateContent xmlns:mc="http://schemas.openxmlformats.org/markup-compatibility/2006">
-    <mc:Choice xmlns:p14="http://schemas.microsoft.com/office/powerpoint/2010/main" Requires="p14">
+  <mc:AlternateContent xmlns:mc="http://schemas.openxmlformats.org/markup-compatibility/2006" xmlns:p14="http://schemas.microsoft.com/office/powerpoint/2010/main">
+    <mc:Choice Requires="p14">
       <p:transition p14:dur="0"/>
     </mc:Choice>
-    <mc:Fallback>
+    <mc:Fallback xmlns="">
       <p:transition/>
     </mc:Fallback>
   </mc:AlternateContent>
@@ -7694,7 +9051,7 @@
 </p:sld>
 </file>
 
-<file path=ppt/slides/slide11.xml><?xml version="1.0" encoding="utf-8"?>
+<file path=ppt/slides/slide8.xml><?xml version="1.0" encoding="utf-8"?>
 <p:sld xmlns:a="http://schemas.openxmlformats.org/drawingml/2006/main" xmlns:r="http://schemas.openxmlformats.org/officeDocument/2006/relationships" xmlns:p="http://schemas.openxmlformats.org/presentationml/2006/main">
   <p:cSld>
     <p:spTree>
@@ -7966,1772 +9323,6 @@
 </p:sld>
 </file>
 
-<file path=ppt/slides/slide12.xml><?xml version="1.0" encoding="utf-8"?>
-<p:sld xmlns:a="http://schemas.openxmlformats.org/drawingml/2006/main" xmlns:r="http://schemas.openxmlformats.org/officeDocument/2006/relationships" xmlns:p="http://schemas.openxmlformats.org/presentationml/2006/main">
-  <p:cSld>
-    <p:spTree>
-      <p:nvGrpSpPr>
-        <p:cNvPr id="1" name=""/>
-        <p:cNvGrpSpPr/>
-        <p:nvPr/>
-      </p:nvGrpSpPr>
-      <p:grpSpPr>
-        <a:xfrm>
-          <a:off x="0" y="0"/>
-          <a:ext cx="0" cy="0"/>
-          <a:chOff x="0" y="0"/>
-          <a:chExt cx="0" cy="0"/>
-        </a:xfrm>
-      </p:grpSpPr>
-      <p:sp>
-        <p:nvSpPr>
-          <p:cNvPr id="2" name="Inhaltsplatzhalter 1"/>
-          <p:cNvSpPr>
-            <a:spLocks noGrp="1"/>
-          </p:cNvSpPr>
-          <p:nvPr>
-            <p:ph sz="half" idx="1"/>
-          </p:nvPr>
-        </p:nvSpPr>
-        <p:spPr/>
-        <p:txBody>
-          <a:bodyPr/>
-          <a:lstStyle/>
-          <a:p>
-            <a:r>
-              <a:rPr lang="de-CH" dirty="0" smtClean="0"/>
-              <a:t>Punkte, Zeit </a:t>
-            </a:r>
-          </a:p>
-          <a:p>
-            <a:endParaRPr lang="de-CH" dirty="0" smtClean="0"/>
-          </a:p>
-          <a:p>
-            <a:r>
-              <a:rPr lang="de-CH" dirty="0" err="1" smtClean="0"/>
-              <a:t>Crosshair</a:t>
-            </a:r>
-            <a:endParaRPr lang="de-CH" dirty="0" smtClean="0"/>
-          </a:p>
-          <a:p>
-            <a:pPr lvl="1"/>
-            <a:r>
-              <a:rPr lang="de-CH" dirty="0" err="1" smtClean="0"/>
-              <a:t>Scrollbar</a:t>
-            </a:r>
-            <a:endParaRPr lang="de-CH" dirty="0"/>
-          </a:p>
-          <a:p>
-            <a:pPr lvl="1"/>
-            <a:r>
-              <a:rPr lang="de-CH" dirty="0" smtClean="0"/>
-              <a:t>Sprites</a:t>
-            </a:r>
-          </a:p>
-          <a:p>
-            <a:pPr lvl="1"/>
-            <a:endParaRPr lang="de-CH" dirty="0" smtClean="0"/>
-          </a:p>
-          <a:p>
-            <a:pPr lvl="1"/>
-            <a:endParaRPr lang="de-CH" dirty="0"/>
-          </a:p>
-          <a:p>
-            <a:pPr lvl="1">
-              <a:buFont typeface="Wingdings" panose="05000000000000000000" pitchFamily="2" charset="2"/>
-              <a:buChar char="à"/>
-            </a:pPr>
-            <a:r>
-              <a:rPr lang="de-CH" dirty="0" smtClean="0">
-                <a:sym typeface="Wingdings" panose="05000000000000000000" pitchFamily="2" charset="2"/>
-              </a:rPr>
-              <a:t>«</a:t>
-            </a:r>
-            <a:r>
-              <a:rPr lang="de-CH" dirty="0" err="1" smtClean="0">
-                <a:sym typeface="Wingdings" panose="05000000000000000000" pitchFamily="2" charset="2"/>
-              </a:rPr>
-              <a:t>onGUI</a:t>
-            </a:r>
-            <a:r>
-              <a:rPr lang="de-CH" dirty="0" smtClean="0">
-                <a:sym typeface="Wingdings" panose="05000000000000000000" pitchFamily="2" charset="2"/>
-              </a:rPr>
-              <a:t>» Funktion mit </a:t>
-            </a:r>
-            <a:r>
-              <a:rPr lang="de-CH" dirty="0" err="1" smtClean="0">
-                <a:sym typeface="Wingdings" panose="05000000000000000000" pitchFamily="2" charset="2"/>
-              </a:rPr>
-              <a:t>DrawTexture</a:t>
-            </a:r>
-            <a:endParaRPr lang="de-CH" dirty="0" smtClean="0">
-              <a:sym typeface="Wingdings" panose="05000000000000000000" pitchFamily="2" charset="2"/>
-            </a:endParaRPr>
-          </a:p>
-          <a:p>
-            <a:pPr lvl="1">
-              <a:buFont typeface="Wingdings" panose="05000000000000000000" pitchFamily="2" charset="2"/>
-              <a:buChar char="à"/>
-            </a:pPr>
-            <a:endParaRPr lang="de-CH" dirty="0">
-              <a:sym typeface="Wingdings" panose="05000000000000000000" pitchFamily="2" charset="2"/>
-            </a:endParaRPr>
-          </a:p>
-          <a:p>
-            <a:pPr lvl="1">
-              <a:buFont typeface="Wingdings" panose="05000000000000000000" pitchFamily="2" charset="2"/>
-              <a:buChar char="à"/>
-            </a:pPr>
-            <a:endParaRPr lang="de-CH" dirty="0" smtClean="0"/>
-          </a:p>
-          <a:p>
-            <a:endParaRPr lang="de-CH" dirty="0"/>
-          </a:p>
-          <a:p>
-            <a:pPr lvl="1"/>
-            <a:endParaRPr lang="de-CH" dirty="0"/>
-          </a:p>
-        </p:txBody>
-      </p:sp>
-      <p:sp>
-        <p:nvSpPr>
-          <p:cNvPr id="3" name="Titel 2"/>
-          <p:cNvSpPr>
-            <a:spLocks noGrp="1"/>
-          </p:cNvSpPr>
-          <p:nvPr>
-            <p:ph type="ctrTitle"/>
-          </p:nvPr>
-        </p:nvSpPr>
-        <p:spPr/>
-        <p:txBody>
-          <a:bodyPr/>
-          <a:lstStyle/>
-          <a:p>
-            <a:r>
-              <a:rPr lang="de-CH" dirty="0" smtClean="0"/>
-              <a:t>GUI</a:t>
-            </a:r>
-            <a:endParaRPr lang="de-CH" dirty="0"/>
-          </a:p>
-        </p:txBody>
-      </p:sp>
-    </p:spTree>
-    <p:extLst>
-      <p:ext uri="{BB962C8B-B14F-4D97-AF65-F5344CB8AC3E}">
-        <p14:creationId xmlns:p14="http://schemas.microsoft.com/office/powerpoint/2010/main" val="2202351975"/>
-      </p:ext>
-    </p:extLst>
-  </p:cSld>
-  <p:clrMapOvr>
-    <a:masterClrMapping/>
-  </p:clrMapOvr>
-  <p:timing>
-    <p:tnLst>
-      <p:par>
-        <p:cTn id="1" dur="indefinite" restart="never" nodeType="tmRoot"/>
-      </p:par>
-    </p:tnLst>
-  </p:timing>
-</p:sld>
-</file>
-
-<file path=ppt/slides/slide2.xml><?xml version="1.0" encoding="utf-8"?>
-<p:sld xmlns:a="http://schemas.openxmlformats.org/drawingml/2006/main" xmlns:r="http://schemas.openxmlformats.org/officeDocument/2006/relationships" xmlns:p="http://schemas.openxmlformats.org/presentationml/2006/main">
-  <p:cSld>
-    <p:spTree>
-      <p:nvGrpSpPr>
-        <p:cNvPr id="1" name=""/>
-        <p:cNvGrpSpPr/>
-        <p:nvPr/>
-      </p:nvGrpSpPr>
-      <p:grpSpPr>
-        <a:xfrm>
-          <a:off x="0" y="0"/>
-          <a:ext cx="0" cy="0"/>
-          <a:chOff x="0" y="0"/>
-          <a:chExt cx="0" cy="0"/>
-        </a:xfrm>
-      </p:grpSpPr>
-      <p:sp>
-        <p:nvSpPr>
-          <p:cNvPr id="2" name="Inhaltsplatzhalter 1"/>
-          <p:cNvSpPr>
-            <a:spLocks noGrp="1"/>
-          </p:cNvSpPr>
-          <p:nvPr>
-            <p:ph sz="half" idx="1"/>
-          </p:nvPr>
-        </p:nvSpPr>
-        <p:spPr/>
-        <p:txBody>
-          <a:bodyPr/>
-          <a:lstStyle/>
-          <a:p>
-            <a:r>
-              <a:rPr lang="de-CH" dirty="0" smtClean="0"/>
-              <a:t>Multiplayer</a:t>
-            </a:r>
-          </a:p>
-          <a:p>
-            <a:pPr lvl="1"/>
-            <a:r>
-              <a:rPr lang="de-CH" dirty="0" err="1" smtClean="0"/>
-              <a:t>Spawnpoints</a:t>
-            </a:r>
-            <a:endParaRPr lang="de-CH" dirty="0" smtClean="0"/>
-          </a:p>
-          <a:p>
-            <a:pPr lvl="1"/>
-            <a:r>
-              <a:rPr lang="de-CH" dirty="0" smtClean="0"/>
-              <a:t>Synchronisation </a:t>
-            </a:r>
-            <a:r>
-              <a:rPr lang="de-CH" dirty="0" err="1" smtClean="0"/>
-              <a:t>Rockets</a:t>
-            </a:r>
-            <a:r>
-              <a:rPr lang="de-CH" dirty="0" smtClean="0"/>
-              <a:t>/Explosionen, Autos, Rotationen</a:t>
-            </a:r>
-          </a:p>
-          <a:p>
-            <a:pPr lvl="1"/>
-            <a:endParaRPr lang="de-CH" dirty="0"/>
-          </a:p>
-        </p:txBody>
-      </p:sp>
-      <p:sp>
-        <p:nvSpPr>
-          <p:cNvPr id="3" name="Titel 2"/>
-          <p:cNvSpPr>
-            <a:spLocks noGrp="1"/>
-          </p:cNvSpPr>
-          <p:nvPr>
-            <p:ph type="ctrTitle"/>
-          </p:nvPr>
-        </p:nvSpPr>
-        <p:spPr/>
-        <p:txBody>
-          <a:bodyPr/>
-          <a:lstStyle/>
-          <a:p>
-            <a:r>
-              <a:rPr lang="de-CH" dirty="0" smtClean="0"/>
-              <a:t>Erweiterungen</a:t>
-            </a:r>
-            <a:endParaRPr lang="de-CH" dirty="0"/>
-          </a:p>
-        </p:txBody>
-      </p:sp>
-    </p:spTree>
-    <p:extLst>
-      <p:ext uri="{BB962C8B-B14F-4D97-AF65-F5344CB8AC3E}">
-        <p14:creationId xmlns:p14="http://schemas.microsoft.com/office/powerpoint/2010/main" val="1848834853"/>
-      </p:ext>
-    </p:extLst>
-  </p:cSld>
-  <p:clrMapOvr>
-    <a:masterClrMapping/>
-  </p:clrMapOvr>
-  <p:timing>
-    <p:tnLst>
-      <p:par>
-        <p:cTn id="1" dur="indefinite" restart="never" nodeType="tmRoot"/>
-      </p:par>
-    </p:tnLst>
-  </p:timing>
-</p:sld>
-</file>
-
-<file path=ppt/slides/slide3.xml><?xml version="1.0" encoding="utf-8"?>
-<p:sld xmlns:a="http://schemas.openxmlformats.org/drawingml/2006/main" xmlns:r="http://schemas.openxmlformats.org/officeDocument/2006/relationships" xmlns:p="http://schemas.openxmlformats.org/presentationml/2006/main">
-  <p:cSld>
-    <p:spTree>
-      <p:nvGrpSpPr>
-        <p:cNvPr id="1" name=""/>
-        <p:cNvGrpSpPr/>
-        <p:nvPr/>
-      </p:nvGrpSpPr>
-      <p:grpSpPr>
-        <a:xfrm>
-          <a:off x="0" y="0"/>
-          <a:ext cx="0" cy="0"/>
-          <a:chOff x="0" y="0"/>
-          <a:chExt cx="0" cy="0"/>
-        </a:xfrm>
-      </p:grpSpPr>
-      <p:sp>
-        <p:nvSpPr>
-          <p:cNvPr id="2" name="Inhaltsplatzhalter 1"/>
-          <p:cNvSpPr>
-            <a:spLocks noGrp="1"/>
-          </p:cNvSpPr>
-          <p:nvPr>
-            <p:ph sz="half" idx="1"/>
-          </p:nvPr>
-        </p:nvSpPr>
-        <p:spPr/>
-        <p:txBody>
-          <a:bodyPr/>
-          <a:lstStyle/>
-          <a:p>
-            <a:r>
-              <a:rPr lang="de-CH" dirty="0" smtClean="0"/>
-              <a:t>Multiplayer</a:t>
-            </a:r>
-          </a:p>
-          <a:p>
-            <a:pPr lvl="1"/>
-            <a:endParaRPr lang="de-CH" dirty="0"/>
-          </a:p>
-          <a:p>
-            <a:r>
-              <a:rPr lang="de-CH" dirty="0" err="1" smtClean="0"/>
-              <a:t>Rockets</a:t>
-            </a:r>
-            <a:endParaRPr lang="de-CH" dirty="0" smtClean="0"/>
-          </a:p>
-          <a:p>
-            <a:pPr lvl="1"/>
-            <a:r>
-              <a:rPr lang="de-CH" dirty="0" smtClean="0"/>
-              <a:t>Explosion nach </a:t>
-            </a:r>
-            <a:r>
-              <a:rPr lang="de-CH" dirty="0" smtClean="0"/>
-              <a:t>Zeit</a:t>
-            </a:r>
-          </a:p>
-          <a:p>
-            <a:pPr lvl="1"/>
-            <a:r>
-              <a:rPr lang="de-CH" dirty="0" smtClean="0"/>
-              <a:t>Physikalische Kraft auf die Autos</a:t>
-            </a:r>
-          </a:p>
-          <a:p>
-            <a:pPr lvl="1"/>
-            <a:r>
-              <a:rPr lang="de-CH" dirty="0" smtClean="0"/>
-              <a:t>Punktesystem</a:t>
-            </a:r>
-          </a:p>
-        </p:txBody>
-      </p:sp>
-      <p:sp>
-        <p:nvSpPr>
-          <p:cNvPr id="3" name="Titel 2"/>
-          <p:cNvSpPr>
-            <a:spLocks noGrp="1"/>
-          </p:cNvSpPr>
-          <p:nvPr>
-            <p:ph type="ctrTitle"/>
-          </p:nvPr>
-        </p:nvSpPr>
-        <p:spPr/>
-        <p:txBody>
-          <a:bodyPr/>
-          <a:lstStyle/>
-          <a:p>
-            <a:r>
-              <a:rPr lang="de-CH" dirty="0" smtClean="0"/>
-              <a:t>Erweiterungen</a:t>
-            </a:r>
-            <a:endParaRPr lang="de-CH" dirty="0"/>
-          </a:p>
-        </p:txBody>
-      </p:sp>
-    </p:spTree>
-    <p:extLst>
-      <p:ext uri="{BB962C8B-B14F-4D97-AF65-F5344CB8AC3E}">
-        <p14:creationId xmlns:p14="http://schemas.microsoft.com/office/powerpoint/2010/main" val="1556216042"/>
-      </p:ext>
-    </p:extLst>
-  </p:cSld>
-  <p:clrMapOvr>
-    <a:masterClrMapping/>
-  </p:clrMapOvr>
-  <p:timing>
-    <p:tnLst>
-      <p:par>
-        <p:cTn id="1" dur="indefinite" restart="never" nodeType="tmRoot"/>
-      </p:par>
-    </p:tnLst>
-  </p:timing>
-</p:sld>
-</file>
-
-<file path=ppt/slides/slide4.xml><?xml version="1.0" encoding="utf-8"?>
-<p:sld xmlns:a="http://schemas.openxmlformats.org/drawingml/2006/main" xmlns:r="http://schemas.openxmlformats.org/officeDocument/2006/relationships" xmlns:p="http://schemas.openxmlformats.org/presentationml/2006/main">
-  <p:cSld>
-    <p:spTree>
-      <p:nvGrpSpPr>
-        <p:cNvPr id="1" name=""/>
-        <p:cNvGrpSpPr/>
-        <p:nvPr/>
-      </p:nvGrpSpPr>
-      <p:grpSpPr>
-        <a:xfrm>
-          <a:off x="0" y="0"/>
-          <a:ext cx="0" cy="0"/>
-          <a:chOff x="0" y="0"/>
-          <a:chExt cx="0" cy="0"/>
-        </a:xfrm>
-      </p:grpSpPr>
-      <p:sp>
-        <p:nvSpPr>
-          <p:cNvPr id="2" name="Inhaltsplatzhalter 1"/>
-          <p:cNvSpPr>
-            <a:spLocks noGrp="1"/>
-          </p:cNvSpPr>
-          <p:nvPr>
-            <p:ph sz="half" idx="1"/>
-          </p:nvPr>
-        </p:nvSpPr>
-        <p:spPr/>
-        <p:txBody>
-          <a:bodyPr/>
-          <a:lstStyle/>
-          <a:p>
-            <a:r>
-              <a:rPr lang="de-CH" dirty="0" smtClean="0"/>
-              <a:t>Multiplayer</a:t>
-            </a:r>
-          </a:p>
-          <a:p>
-            <a:pPr lvl="1"/>
-            <a:endParaRPr lang="de-CH" dirty="0"/>
-          </a:p>
-          <a:p>
-            <a:r>
-              <a:rPr lang="de-CH" dirty="0" err="1" smtClean="0"/>
-              <a:t>Rockets</a:t>
-            </a:r>
-            <a:endParaRPr lang="de-CH" dirty="0" smtClean="0"/>
-          </a:p>
-          <a:p>
-            <a:pPr lvl="1"/>
-            <a:endParaRPr lang="de-CH" dirty="0"/>
-          </a:p>
-          <a:p>
-            <a:r>
-              <a:rPr lang="de-CH" dirty="0" smtClean="0"/>
-              <a:t>Models</a:t>
-            </a:r>
-          </a:p>
-          <a:p>
-            <a:pPr lvl="1"/>
-            <a:r>
-              <a:rPr lang="de-CH" dirty="0" smtClean="0"/>
-              <a:t>Elemente aus dem </a:t>
-            </a:r>
-            <a:r>
-              <a:rPr lang="de-CH" dirty="0" err="1" smtClean="0"/>
-              <a:t>Assetstore</a:t>
-            </a:r>
-            <a:r>
-              <a:rPr lang="de-CH" dirty="0" smtClean="0"/>
-              <a:t> &amp; </a:t>
-            </a:r>
-            <a:r>
-              <a:rPr lang="de-CH" dirty="0" err="1" smtClean="0"/>
-              <a:t>Rotationsscripts</a:t>
-            </a:r>
-            <a:endParaRPr lang="de-CH" dirty="0" smtClean="0"/>
-          </a:p>
-          <a:p>
-            <a:pPr lvl="1"/>
-            <a:r>
-              <a:rPr lang="de-CH" dirty="0" smtClean="0"/>
-              <a:t>Bearbeitung mit Visual Studio</a:t>
-            </a:r>
-          </a:p>
-        </p:txBody>
-      </p:sp>
-      <p:sp>
-        <p:nvSpPr>
-          <p:cNvPr id="3" name="Titel 2"/>
-          <p:cNvSpPr>
-            <a:spLocks noGrp="1"/>
-          </p:cNvSpPr>
-          <p:nvPr>
-            <p:ph type="ctrTitle"/>
-          </p:nvPr>
-        </p:nvSpPr>
-        <p:spPr/>
-        <p:txBody>
-          <a:bodyPr/>
-          <a:lstStyle/>
-          <a:p>
-            <a:r>
-              <a:rPr lang="de-CH" dirty="0" smtClean="0"/>
-              <a:t>Erweiterungen</a:t>
-            </a:r>
-            <a:endParaRPr lang="de-CH" dirty="0"/>
-          </a:p>
-        </p:txBody>
-      </p:sp>
-    </p:spTree>
-    <p:extLst>
-      <p:ext uri="{BB962C8B-B14F-4D97-AF65-F5344CB8AC3E}">
-        <p14:creationId xmlns:p14="http://schemas.microsoft.com/office/powerpoint/2010/main" val="490265965"/>
-      </p:ext>
-    </p:extLst>
-  </p:cSld>
-  <p:clrMapOvr>
-    <a:masterClrMapping/>
-  </p:clrMapOvr>
-  <p:timing>
-    <p:tnLst>
-      <p:par>
-        <p:cTn id="1" dur="indefinite" restart="never" nodeType="tmRoot"/>
-      </p:par>
-    </p:tnLst>
-  </p:timing>
-</p:sld>
-</file>
-
-<file path=ppt/slides/slide5.xml><?xml version="1.0" encoding="utf-8"?>
-<p:sld xmlns:a="http://schemas.openxmlformats.org/drawingml/2006/main" xmlns:r="http://schemas.openxmlformats.org/officeDocument/2006/relationships" xmlns:p="http://schemas.openxmlformats.org/presentationml/2006/main">
-  <p:cSld>
-    <p:spTree>
-      <p:nvGrpSpPr>
-        <p:cNvPr id="1" name=""/>
-        <p:cNvGrpSpPr/>
-        <p:nvPr/>
-      </p:nvGrpSpPr>
-      <p:grpSpPr>
-        <a:xfrm>
-          <a:off x="0" y="0"/>
-          <a:ext cx="0" cy="0"/>
-          <a:chOff x="0" y="0"/>
-          <a:chExt cx="0" cy="0"/>
-        </a:xfrm>
-      </p:grpSpPr>
-      <p:sp>
-        <p:nvSpPr>
-          <p:cNvPr id="2" name="Inhaltsplatzhalter 1"/>
-          <p:cNvSpPr>
-            <a:spLocks noGrp="1"/>
-          </p:cNvSpPr>
-          <p:nvPr>
-            <p:ph sz="half" idx="1"/>
-          </p:nvPr>
-        </p:nvSpPr>
-        <p:spPr/>
-        <p:txBody>
-          <a:bodyPr/>
-          <a:lstStyle/>
-          <a:p>
-            <a:r>
-              <a:rPr lang="de-CH" dirty="0" smtClean="0"/>
-              <a:t>Multiplayer</a:t>
-            </a:r>
-          </a:p>
-          <a:p>
-            <a:pPr lvl="1"/>
-            <a:endParaRPr lang="de-CH" dirty="0"/>
-          </a:p>
-          <a:p>
-            <a:r>
-              <a:rPr lang="de-CH" dirty="0" err="1" smtClean="0"/>
-              <a:t>Rockets</a:t>
-            </a:r>
-            <a:endParaRPr lang="de-CH" dirty="0" smtClean="0"/>
-          </a:p>
-          <a:p>
-            <a:pPr lvl="1"/>
-            <a:endParaRPr lang="de-CH" dirty="0"/>
-          </a:p>
-          <a:p>
-            <a:r>
-              <a:rPr lang="de-CH" dirty="0" smtClean="0"/>
-              <a:t>Models</a:t>
-            </a:r>
-          </a:p>
-          <a:p>
-            <a:pPr lvl="1"/>
-            <a:endParaRPr lang="de-CH" dirty="0"/>
-          </a:p>
-          <a:p>
-            <a:r>
-              <a:rPr lang="de-CH" dirty="0" smtClean="0"/>
-              <a:t>GUI</a:t>
-            </a:r>
-          </a:p>
-          <a:p>
-            <a:pPr lvl="1"/>
-            <a:r>
-              <a:rPr lang="de-CH" dirty="0" smtClean="0"/>
-              <a:t>Erweiterungen für </a:t>
-            </a:r>
-            <a:r>
-              <a:rPr lang="de-CH" dirty="0" smtClean="0"/>
-              <a:t>Punkte und </a:t>
-            </a:r>
-            <a:r>
-              <a:rPr lang="de-CH" dirty="0" smtClean="0"/>
-              <a:t>Zeit</a:t>
-            </a:r>
-          </a:p>
-          <a:p>
-            <a:pPr lvl="1"/>
-            <a:r>
-              <a:rPr lang="de-CH" dirty="0" err="1" smtClean="0"/>
-              <a:t>Crosshair</a:t>
-            </a:r>
-            <a:endParaRPr lang="de-CH" dirty="0" smtClean="0"/>
-          </a:p>
-        </p:txBody>
-      </p:sp>
-      <p:sp>
-        <p:nvSpPr>
-          <p:cNvPr id="3" name="Titel 2"/>
-          <p:cNvSpPr>
-            <a:spLocks noGrp="1"/>
-          </p:cNvSpPr>
-          <p:nvPr>
-            <p:ph type="ctrTitle"/>
-          </p:nvPr>
-        </p:nvSpPr>
-        <p:spPr/>
-        <p:txBody>
-          <a:bodyPr/>
-          <a:lstStyle/>
-          <a:p>
-            <a:r>
-              <a:rPr lang="de-CH" dirty="0" smtClean="0"/>
-              <a:t>Erweiterungen</a:t>
-            </a:r>
-            <a:endParaRPr lang="de-CH" dirty="0"/>
-          </a:p>
-        </p:txBody>
-      </p:sp>
-    </p:spTree>
-    <p:extLst>
-      <p:ext uri="{BB962C8B-B14F-4D97-AF65-F5344CB8AC3E}">
-        <p14:creationId xmlns:p14="http://schemas.microsoft.com/office/powerpoint/2010/main" val="3990788436"/>
-      </p:ext>
-    </p:extLst>
-  </p:cSld>
-  <p:clrMapOvr>
-    <a:masterClrMapping/>
-  </p:clrMapOvr>
-  <p:timing>
-    <p:tnLst>
-      <p:par>
-        <p:cTn id="1" dur="indefinite" restart="never" nodeType="tmRoot"/>
-      </p:par>
-    </p:tnLst>
-  </p:timing>
-</p:sld>
-</file>
-
-<file path=ppt/slides/slide6.xml><?xml version="1.0" encoding="utf-8"?>
-<p:sld xmlns:a="http://schemas.openxmlformats.org/drawingml/2006/main" xmlns:r="http://schemas.openxmlformats.org/officeDocument/2006/relationships" xmlns:p="http://schemas.openxmlformats.org/presentationml/2006/main">
-  <p:cSld>
-    <p:spTree>
-      <p:nvGrpSpPr>
-        <p:cNvPr id="1" name=""/>
-        <p:cNvGrpSpPr/>
-        <p:nvPr/>
-      </p:nvGrpSpPr>
-      <p:grpSpPr>
-        <a:xfrm>
-          <a:off x="0" y="0"/>
-          <a:ext cx="0" cy="0"/>
-          <a:chOff x="0" y="0"/>
-          <a:chExt cx="0" cy="0"/>
-        </a:xfrm>
-      </p:grpSpPr>
-      <p:sp>
-        <p:nvSpPr>
-          <p:cNvPr id="2" name="Inhaltsplatzhalter 1"/>
-          <p:cNvSpPr>
-            <a:spLocks noGrp="1"/>
-          </p:cNvSpPr>
-          <p:nvPr>
-            <p:ph sz="half" idx="1"/>
-          </p:nvPr>
-        </p:nvSpPr>
-        <p:spPr/>
-        <p:txBody>
-          <a:bodyPr/>
-          <a:lstStyle/>
-          <a:p>
-            <a:r>
-              <a:rPr lang="de-CH" dirty="0" smtClean="0"/>
-              <a:t>Connect </a:t>
-            </a:r>
-            <a:r>
-              <a:rPr lang="de-CH" dirty="0" err="1" smtClean="0"/>
-              <a:t>onLevelLoad</a:t>
-            </a:r>
-            <a:r>
-              <a:rPr lang="de-CH" dirty="0" smtClean="0"/>
-              <a:t> / </a:t>
-            </a:r>
-            <a:r>
-              <a:rPr lang="de-CH" dirty="0" err="1" smtClean="0"/>
-              <a:t>Disconnect</a:t>
-            </a:r>
-            <a:r>
-              <a:rPr lang="de-CH" dirty="0" smtClean="0"/>
-              <a:t> </a:t>
-            </a:r>
-            <a:r>
-              <a:rPr lang="de-CH" dirty="0" err="1" smtClean="0"/>
-              <a:t>onQuit</a:t>
-            </a:r>
-            <a:endParaRPr lang="de-CH" dirty="0" smtClean="0"/>
-          </a:p>
-          <a:p>
-            <a:r>
-              <a:rPr lang="de-CH" dirty="0" err="1" smtClean="0"/>
-              <a:t>Spawnpoints</a:t>
-            </a:r>
-            <a:endParaRPr lang="de-CH" dirty="0" smtClean="0"/>
-          </a:p>
-        </p:txBody>
-      </p:sp>
-      <p:sp>
-        <p:nvSpPr>
-          <p:cNvPr id="3" name="Titel 2"/>
-          <p:cNvSpPr>
-            <a:spLocks noGrp="1"/>
-          </p:cNvSpPr>
-          <p:nvPr>
-            <p:ph type="ctrTitle"/>
-          </p:nvPr>
-        </p:nvSpPr>
-        <p:spPr/>
-        <p:txBody>
-          <a:bodyPr/>
-          <a:lstStyle/>
-          <a:p>
-            <a:r>
-              <a:rPr lang="de-CH" dirty="0" smtClean="0"/>
-              <a:t>Multiplayer</a:t>
-            </a:r>
-            <a:endParaRPr lang="de-CH" dirty="0"/>
-          </a:p>
-        </p:txBody>
-      </p:sp>
-      <p:pic>
-        <p:nvPicPr>
-          <p:cNvPr id="1026" name="Picture 2"/>
-          <p:cNvPicPr>
-            <a:picLocks noChangeAspect="1" noChangeArrowheads="1"/>
-          </p:cNvPicPr>
-          <p:nvPr/>
-        </p:nvPicPr>
-        <p:blipFill>
-          <a:blip r:embed="rId2">
-            <a:extLst>
-              <a:ext uri="{28A0092B-C50C-407E-A947-70E740481C1C}">
-                <a14:useLocalDpi xmlns:a14="http://schemas.microsoft.com/office/drawing/2010/main" val="0"/>
-              </a:ext>
-            </a:extLst>
-          </a:blip>
-          <a:srcRect/>
-          <a:stretch>
-            <a:fillRect/>
-          </a:stretch>
-        </p:blipFill>
-        <p:spPr bwMode="auto">
-          <a:xfrm>
-            <a:off x="768348" y="2284414"/>
-            <a:ext cx="5188222" cy="2922586"/>
-          </a:xfrm>
-          <a:prstGeom prst="rect">
-            <a:avLst/>
-          </a:prstGeom>
-          <a:noFill/>
-          <a:ln w="9525">
-            <a:solidFill>
-              <a:schemeClr val="tx1"/>
-            </a:solidFill>
-            <a:miter lim="800000"/>
-            <a:headEnd/>
-            <a:tailEnd/>
-          </a:ln>
-          <a:extLst>
-            <a:ext uri="{909E8E84-426E-40DD-AFC4-6F175D3DCCD1}">
-              <a14:hiddenFill xmlns:a14="http://schemas.microsoft.com/office/drawing/2010/main">
-                <a:solidFill>
-                  <a:schemeClr val="accent1"/>
-                </a:solidFill>
-              </a14:hiddenFill>
-            </a:ext>
-          </a:extLst>
-        </p:spPr>
-      </p:pic>
-    </p:spTree>
-    <p:extLst>
-      <p:ext uri="{BB962C8B-B14F-4D97-AF65-F5344CB8AC3E}">
-        <p14:creationId xmlns:p14="http://schemas.microsoft.com/office/powerpoint/2010/main" val="1826969257"/>
-      </p:ext>
-    </p:extLst>
-  </p:cSld>
-  <p:clrMapOvr>
-    <a:masterClrMapping/>
-  </p:clrMapOvr>
-  <p:timing>
-    <p:tnLst>
-      <p:par>
-        <p:cTn id="1" dur="indefinite" restart="never" nodeType="tmRoot">
-          <p:childTnLst>
-            <p:seq concurrent="1" nextAc="seek">
-              <p:cTn id="2" dur="indefinite" nodeType="mainSeq">
-                <p:childTnLst>
-                  <p:par>
-                    <p:cTn id="3" fill="hold">
-                      <p:stCondLst>
-                        <p:cond delay="indefinite"/>
-                      </p:stCondLst>
-                      <p:childTnLst>
-                        <p:par>
-                          <p:cTn id="4" fill="hold">
-                            <p:stCondLst>
-                              <p:cond delay="0"/>
-                            </p:stCondLst>
-                            <p:childTnLst>
-                              <p:par>
-                                <p:cTn id="5" presetID="1" presetClass="entr" presetSubtype="0" fill="hold" nodeType="clickEffect">
-                                  <p:stCondLst>
-                                    <p:cond delay="0"/>
-                                  </p:stCondLst>
-                                  <p:childTnLst>
-                                    <p:set>
-                                      <p:cBhvr>
-                                        <p:cTn id="6" dur="1" fill="hold">
-                                          <p:stCondLst>
-                                            <p:cond delay="0"/>
-                                          </p:stCondLst>
-                                        </p:cTn>
-                                        <p:tgtEl>
-                                          <p:spTgt spid="2">
-                                            <p:txEl>
-                                              <p:pRg st="0" end="0"/>
-                                            </p:txEl>
-                                          </p:spTgt>
-                                        </p:tgtEl>
-                                        <p:attrNameLst>
-                                          <p:attrName>style.visibility</p:attrName>
-                                        </p:attrNameLst>
-                                      </p:cBhvr>
-                                      <p:to>
-                                        <p:strVal val="visible"/>
-                                      </p:to>
-                                    </p:set>
-                                  </p:childTnLst>
-                                </p:cTn>
-                              </p:par>
-                            </p:childTnLst>
-                          </p:cTn>
-                        </p:par>
-                      </p:childTnLst>
-                    </p:cTn>
-                  </p:par>
-                  <p:par>
-                    <p:cTn id="7" fill="hold">
-                      <p:stCondLst>
-                        <p:cond delay="indefinite"/>
-                      </p:stCondLst>
-                      <p:childTnLst>
-                        <p:par>
-                          <p:cTn id="8" fill="hold">
-                            <p:stCondLst>
-                              <p:cond delay="0"/>
-                            </p:stCondLst>
-                            <p:childTnLst>
-                              <p:par>
-                                <p:cTn id="9" presetID="1" presetClass="entr" presetSubtype="0" fill="hold" nodeType="clickEffect">
-                                  <p:stCondLst>
-                                    <p:cond delay="0"/>
-                                  </p:stCondLst>
-                                  <p:childTnLst>
-                                    <p:set>
-                                      <p:cBhvr>
-                                        <p:cTn id="10" dur="1" fill="hold">
-                                          <p:stCondLst>
-                                            <p:cond delay="0"/>
-                                          </p:stCondLst>
-                                        </p:cTn>
-                                        <p:tgtEl>
-                                          <p:spTgt spid="2">
-                                            <p:txEl>
-                                              <p:pRg st="1" end="1"/>
-                                            </p:txEl>
-                                          </p:spTgt>
-                                        </p:tgtEl>
-                                        <p:attrNameLst>
-                                          <p:attrName>style.visibility</p:attrName>
-                                        </p:attrNameLst>
-                                      </p:cBhvr>
-                                      <p:to>
-                                        <p:strVal val="visible"/>
-                                      </p:to>
-                                    </p:set>
-                                  </p:childTnLst>
-                                </p:cTn>
-                              </p:par>
-                            </p:childTnLst>
-                          </p:cTn>
-                        </p:par>
-                      </p:childTnLst>
-                    </p:cTn>
-                  </p:par>
-                  <p:par>
-                    <p:cTn id="11" fill="hold">
-                      <p:stCondLst>
-                        <p:cond delay="indefinite"/>
-                      </p:stCondLst>
-                      <p:childTnLst>
-                        <p:par>
-                          <p:cTn id="12" fill="hold">
-                            <p:stCondLst>
-                              <p:cond delay="0"/>
-                            </p:stCondLst>
-                            <p:childTnLst>
-                              <p:par>
-                                <p:cTn id="13" presetID="1" presetClass="entr" presetSubtype="0" fill="hold" nodeType="clickEffect">
-                                  <p:stCondLst>
-                                    <p:cond delay="0"/>
-                                  </p:stCondLst>
-                                  <p:childTnLst>
-                                    <p:set>
-                                      <p:cBhvr>
-                                        <p:cTn id="14" dur="1" fill="hold">
-                                          <p:stCondLst>
-                                            <p:cond delay="0"/>
-                                          </p:stCondLst>
-                                        </p:cTn>
-                                        <p:tgtEl>
-                                          <p:spTgt spid="1026"/>
-                                        </p:tgtEl>
-                                        <p:attrNameLst>
-                                          <p:attrName>style.visibility</p:attrName>
-                                        </p:attrNameLst>
-                                      </p:cBhvr>
-                                      <p:to>
-                                        <p:strVal val="visible"/>
-                                      </p:to>
-                                    </p:set>
-                                  </p:childTnLst>
-                                </p:cTn>
-                              </p:par>
-                            </p:childTnLst>
-                          </p:cTn>
-                        </p:par>
-                      </p:childTnLst>
-                    </p:cTn>
-                  </p:par>
-                </p:childTnLst>
-              </p:cTn>
-              <p:prevCondLst>
-                <p:cond evt="onPrev" delay="0">
-                  <p:tgtEl>
-                    <p:sldTgt/>
-                  </p:tgtEl>
-                </p:cond>
-              </p:prevCondLst>
-              <p:nextCondLst>
-                <p:cond evt="onNext" delay="0">
-                  <p:tgtEl>
-                    <p:sldTgt/>
-                  </p:tgtEl>
-                </p:cond>
-              </p:nextCondLst>
-            </p:seq>
-          </p:childTnLst>
-        </p:cTn>
-      </p:par>
-    </p:tnLst>
-  </p:timing>
-</p:sld>
-</file>
-
-<file path=ppt/slides/slide7.xml><?xml version="1.0" encoding="utf-8"?>
-<p:sld xmlns:a="http://schemas.openxmlformats.org/drawingml/2006/main" xmlns:r="http://schemas.openxmlformats.org/officeDocument/2006/relationships" xmlns:p="http://schemas.openxmlformats.org/presentationml/2006/main">
-  <p:cSld>
-    <p:spTree>
-      <p:nvGrpSpPr>
-        <p:cNvPr id="1" name=""/>
-        <p:cNvGrpSpPr/>
-        <p:nvPr/>
-      </p:nvGrpSpPr>
-      <p:grpSpPr>
-        <a:xfrm>
-          <a:off x="0" y="0"/>
-          <a:ext cx="0" cy="0"/>
-          <a:chOff x="0" y="0"/>
-          <a:chExt cx="0" cy="0"/>
-        </a:xfrm>
-      </p:grpSpPr>
-      <p:sp>
-        <p:nvSpPr>
-          <p:cNvPr id="2" name="Inhaltsplatzhalter 1"/>
-          <p:cNvSpPr>
-            <a:spLocks noGrp="1"/>
-          </p:cNvSpPr>
-          <p:nvPr>
-            <p:ph sz="half" idx="1"/>
-          </p:nvPr>
-        </p:nvSpPr>
-        <p:spPr/>
-        <p:txBody>
-          <a:bodyPr/>
-          <a:lstStyle/>
-          <a:p>
-            <a:r>
-              <a:rPr lang="de-CH" dirty="0" smtClean="0"/>
-              <a:t>Synchronisation</a:t>
-            </a:r>
-            <a:endParaRPr lang="de-CH" dirty="0"/>
-          </a:p>
-        </p:txBody>
-      </p:sp>
-      <p:sp>
-        <p:nvSpPr>
-          <p:cNvPr id="3" name="Titel 2"/>
-          <p:cNvSpPr>
-            <a:spLocks noGrp="1"/>
-          </p:cNvSpPr>
-          <p:nvPr>
-            <p:ph type="ctrTitle"/>
-          </p:nvPr>
-        </p:nvSpPr>
-        <p:spPr/>
-        <p:txBody>
-          <a:bodyPr/>
-          <a:lstStyle/>
-          <a:p>
-            <a:r>
-              <a:rPr lang="de-CH" dirty="0" smtClean="0"/>
-              <a:t>Multiplayer</a:t>
-            </a:r>
-            <a:endParaRPr lang="de-CH" dirty="0"/>
-          </a:p>
-        </p:txBody>
-      </p:sp>
-      <p:pic>
-        <p:nvPicPr>
-          <p:cNvPr id="2050" name="Picture 2"/>
-          <p:cNvPicPr>
-            <a:picLocks noChangeAspect="1" noChangeArrowheads="1"/>
-          </p:cNvPicPr>
-          <p:nvPr/>
-        </p:nvPicPr>
-        <p:blipFill>
-          <a:blip r:embed="rId2">
-            <a:extLst>
-              <a:ext uri="{28A0092B-C50C-407E-A947-70E740481C1C}">
-                <a14:useLocalDpi xmlns:a14="http://schemas.microsoft.com/office/drawing/2010/main" val="0"/>
-              </a:ext>
-            </a:extLst>
-          </a:blip>
-          <a:srcRect/>
-          <a:stretch>
-            <a:fillRect/>
-          </a:stretch>
-        </p:blipFill>
-        <p:spPr bwMode="auto">
-          <a:xfrm>
-            <a:off x="2400878" y="2261128"/>
-            <a:ext cx="5634037" cy="3447431"/>
-          </a:xfrm>
-          <a:prstGeom prst="rect">
-            <a:avLst/>
-          </a:prstGeom>
-          <a:noFill/>
-          <a:ln>
-            <a:noFill/>
-          </a:ln>
-          <a:extLst>
-            <a:ext uri="{909E8E84-426E-40DD-AFC4-6F175D3DCCD1}">
-              <a14:hiddenFill xmlns:a14="http://schemas.microsoft.com/office/drawing/2010/main">
-                <a:solidFill>
-                  <a:schemeClr val="accent1"/>
-                </a:solidFill>
-              </a14:hiddenFill>
-            </a:ext>
-            <a:ext uri="{91240B29-F687-4F45-9708-019B960494DF}">
-              <a14:hiddenLine xmlns:a14="http://schemas.microsoft.com/office/drawing/2010/main" w="9525">
-                <a:solidFill>
-                  <a:schemeClr val="tx1"/>
-                </a:solidFill>
-                <a:miter lim="800000"/>
-                <a:headEnd/>
-                <a:tailEnd/>
-              </a14:hiddenLine>
-            </a:ext>
-          </a:extLst>
-        </p:spPr>
-      </p:pic>
-      <p:sp>
-        <p:nvSpPr>
-          <p:cNvPr id="4" name="Textfeld 3"/>
-          <p:cNvSpPr txBox="1"/>
-          <p:nvPr/>
-        </p:nvSpPr>
-        <p:spPr>
-          <a:xfrm>
-            <a:off x="846666" y="3599954"/>
-            <a:ext cx="1656223" cy="246221"/>
-          </a:xfrm>
-          <a:prstGeom prst="rect">
-            <a:avLst/>
-          </a:prstGeom>
-          <a:noFill/>
-        </p:spPr>
-        <p:txBody>
-          <a:bodyPr wrap="none" rtlCol="0">
-            <a:spAutoFit/>
-          </a:bodyPr>
-          <a:lstStyle/>
-          <a:p>
-            <a:r>
-              <a:rPr lang="de-CH" sz="1000" dirty="0" smtClean="0">
-                <a:latin typeface="Lucida Sans"/>
-                <a:cs typeface="Lucida Sans"/>
-              </a:rPr>
-              <a:t>Erstellung </a:t>
-            </a:r>
-            <a:r>
-              <a:rPr lang="de-CH" sz="1000" dirty="0" err="1" smtClean="0">
-                <a:latin typeface="Lucida Sans"/>
-                <a:cs typeface="Lucida Sans"/>
-              </a:rPr>
-              <a:t>Synchronizer</a:t>
-            </a:r>
-            <a:endParaRPr lang="de-CH" sz="1000" dirty="0">
-              <a:latin typeface="Lucida Sans"/>
-              <a:cs typeface="Lucida Sans"/>
-            </a:endParaRPr>
-          </a:p>
-        </p:txBody>
-      </p:sp>
-      <p:sp>
-        <p:nvSpPr>
-          <p:cNvPr id="6" name="Textfeld 5"/>
-          <p:cNvSpPr txBox="1"/>
-          <p:nvPr/>
-        </p:nvSpPr>
-        <p:spPr>
-          <a:xfrm>
-            <a:off x="846666" y="4091021"/>
-            <a:ext cx="1406154" cy="246221"/>
-          </a:xfrm>
-          <a:prstGeom prst="rect">
-            <a:avLst/>
-          </a:prstGeom>
-          <a:noFill/>
-        </p:spPr>
-        <p:txBody>
-          <a:bodyPr wrap="none" rtlCol="0">
-            <a:spAutoFit/>
-          </a:bodyPr>
-          <a:lstStyle/>
-          <a:p>
-            <a:r>
-              <a:rPr lang="de-CH" sz="1000" dirty="0" smtClean="0">
-                <a:latin typeface="Lucida Sans"/>
-                <a:cs typeface="Lucida Sans"/>
-              </a:rPr>
-              <a:t>Scripts deaktivieren</a:t>
-            </a:r>
-            <a:endParaRPr lang="de-CH" sz="1000" dirty="0">
-              <a:latin typeface="Lucida Sans"/>
-              <a:cs typeface="Lucida Sans"/>
-            </a:endParaRPr>
-          </a:p>
-        </p:txBody>
-      </p:sp>
-      <p:sp>
-        <p:nvSpPr>
-          <p:cNvPr id="7" name="Textfeld 6"/>
-          <p:cNvSpPr txBox="1"/>
-          <p:nvPr/>
-        </p:nvSpPr>
-        <p:spPr>
-          <a:xfrm>
-            <a:off x="846666" y="4488951"/>
-            <a:ext cx="1717137" cy="400110"/>
-          </a:xfrm>
-          <a:prstGeom prst="rect">
-            <a:avLst/>
-          </a:prstGeom>
-          <a:noFill/>
-        </p:spPr>
-        <p:txBody>
-          <a:bodyPr wrap="none" rtlCol="0">
-            <a:spAutoFit/>
-          </a:bodyPr>
-          <a:lstStyle/>
-          <a:p>
-            <a:r>
-              <a:rPr lang="de-CH" sz="1000" dirty="0" smtClean="0">
-                <a:latin typeface="Lucida Sans"/>
-                <a:cs typeface="Lucida Sans"/>
-              </a:rPr>
-              <a:t>Positionen  &amp; Rotationen</a:t>
-            </a:r>
-          </a:p>
-          <a:p>
-            <a:r>
-              <a:rPr lang="de-CH" sz="1000" dirty="0" smtClean="0">
-                <a:latin typeface="Lucida Sans"/>
-                <a:cs typeface="Lucida Sans"/>
-              </a:rPr>
-              <a:t>interpolieren</a:t>
-            </a:r>
-            <a:endParaRPr lang="de-CH" sz="1000" dirty="0">
-              <a:latin typeface="Lucida Sans"/>
-              <a:cs typeface="Lucida Sans"/>
-            </a:endParaRPr>
-          </a:p>
-        </p:txBody>
-      </p:sp>
-      <p:sp>
-        <p:nvSpPr>
-          <p:cNvPr id="8" name="Textfeld 7"/>
-          <p:cNvSpPr txBox="1"/>
-          <p:nvPr/>
-        </p:nvSpPr>
-        <p:spPr>
-          <a:xfrm>
-            <a:off x="846666" y="4924545"/>
-            <a:ext cx="1042273" cy="246221"/>
-          </a:xfrm>
-          <a:prstGeom prst="rect">
-            <a:avLst/>
-          </a:prstGeom>
-          <a:noFill/>
-        </p:spPr>
-        <p:txBody>
-          <a:bodyPr wrap="none" rtlCol="0">
-            <a:spAutoFit/>
-          </a:bodyPr>
-          <a:lstStyle/>
-          <a:p>
-            <a:r>
-              <a:rPr lang="de-CH" sz="1000" dirty="0" smtClean="0">
-                <a:latin typeface="Lucida Sans"/>
-                <a:cs typeface="Lucida Sans"/>
-              </a:rPr>
-              <a:t>Daten senden</a:t>
-            </a:r>
-            <a:endParaRPr lang="de-CH" sz="1000" dirty="0">
-              <a:latin typeface="Lucida Sans"/>
-              <a:cs typeface="Lucida Sans"/>
-            </a:endParaRPr>
-          </a:p>
-        </p:txBody>
-      </p:sp>
-      <p:sp>
-        <p:nvSpPr>
-          <p:cNvPr id="9" name="Textfeld 8"/>
-          <p:cNvSpPr txBox="1"/>
-          <p:nvPr/>
-        </p:nvSpPr>
-        <p:spPr>
-          <a:xfrm>
-            <a:off x="846666" y="5214717"/>
-            <a:ext cx="1293944" cy="246221"/>
-          </a:xfrm>
-          <a:prstGeom prst="rect">
-            <a:avLst/>
-          </a:prstGeom>
-          <a:noFill/>
-        </p:spPr>
-        <p:txBody>
-          <a:bodyPr wrap="none" rtlCol="0">
-            <a:spAutoFit/>
-          </a:bodyPr>
-          <a:lstStyle/>
-          <a:p>
-            <a:r>
-              <a:rPr lang="de-CH" sz="1000" dirty="0" smtClean="0">
-                <a:latin typeface="Lucida Sans"/>
-                <a:cs typeface="Lucida Sans"/>
-              </a:rPr>
-              <a:t>Daten empfangen</a:t>
-            </a:r>
-            <a:endParaRPr lang="de-CH" sz="1000" dirty="0">
-              <a:latin typeface="Lucida Sans"/>
-              <a:cs typeface="Lucida Sans"/>
-            </a:endParaRPr>
-          </a:p>
-        </p:txBody>
-      </p:sp>
-    </p:spTree>
-    <p:extLst>
-      <p:ext uri="{BB962C8B-B14F-4D97-AF65-F5344CB8AC3E}">
-        <p14:creationId xmlns:p14="http://schemas.microsoft.com/office/powerpoint/2010/main" val="2216512755"/>
-      </p:ext>
-    </p:extLst>
-  </p:cSld>
-  <p:clrMapOvr>
-    <a:masterClrMapping/>
-  </p:clrMapOvr>
-  <p:timing>
-    <p:tnLst>
-      <p:par>
-        <p:cTn id="1" dur="indefinite" restart="never" nodeType="tmRoot">
-          <p:childTnLst>
-            <p:seq concurrent="1" nextAc="seek">
-              <p:cTn id="2" dur="indefinite" nodeType="mainSeq">
-                <p:childTnLst>
-                  <p:par>
-                    <p:cTn id="3" fill="hold">
-                      <p:stCondLst>
-                        <p:cond delay="indefinite"/>
-                      </p:stCondLst>
-                      <p:childTnLst>
-                        <p:par>
-                          <p:cTn id="4" fill="hold">
-                            <p:stCondLst>
-                              <p:cond delay="0"/>
-                            </p:stCondLst>
-                            <p:childTnLst>
-                              <p:par>
-                                <p:cTn id="5" presetID="1" presetClass="entr" presetSubtype="0" fill="hold" grpId="0" nodeType="clickEffect">
-                                  <p:stCondLst>
-                                    <p:cond delay="0"/>
-                                  </p:stCondLst>
-                                  <p:childTnLst>
-                                    <p:set>
-                                      <p:cBhvr>
-                                        <p:cTn id="6" dur="1" fill="hold">
-                                          <p:stCondLst>
-                                            <p:cond delay="0"/>
-                                          </p:stCondLst>
-                                        </p:cTn>
-                                        <p:tgtEl>
-                                          <p:spTgt spid="4"/>
-                                        </p:tgtEl>
-                                        <p:attrNameLst>
-                                          <p:attrName>style.visibility</p:attrName>
-                                        </p:attrNameLst>
-                                      </p:cBhvr>
-                                      <p:to>
-                                        <p:strVal val="visible"/>
-                                      </p:to>
-                                    </p:set>
-                                  </p:childTnLst>
-                                </p:cTn>
-                              </p:par>
-                            </p:childTnLst>
-                          </p:cTn>
-                        </p:par>
-                      </p:childTnLst>
-                    </p:cTn>
-                  </p:par>
-                  <p:par>
-                    <p:cTn id="7" fill="hold">
-                      <p:stCondLst>
-                        <p:cond delay="indefinite"/>
-                      </p:stCondLst>
-                      <p:childTnLst>
-                        <p:par>
-                          <p:cTn id="8" fill="hold">
-                            <p:stCondLst>
-                              <p:cond delay="0"/>
-                            </p:stCondLst>
-                            <p:childTnLst>
-                              <p:par>
-                                <p:cTn id="9" presetID="1" presetClass="entr" presetSubtype="0" fill="hold" grpId="0" nodeType="clickEffect">
-                                  <p:stCondLst>
-                                    <p:cond delay="0"/>
-                                  </p:stCondLst>
-                                  <p:childTnLst>
-                                    <p:set>
-                                      <p:cBhvr>
-                                        <p:cTn id="10" dur="1" fill="hold">
-                                          <p:stCondLst>
-                                            <p:cond delay="0"/>
-                                          </p:stCondLst>
-                                        </p:cTn>
-                                        <p:tgtEl>
-                                          <p:spTgt spid="6"/>
-                                        </p:tgtEl>
-                                        <p:attrNameLst>
-                                          <p:attrName>style.visibility</p:attrName>
-                                        </p:attrNameLst>
-                                      </p:cBhvr>
-                                      <p:to>
-                                        <p:strVal val="visible"/>
-                                      </p:to>
-                                    </p:set>
-                                  </p:childTnLst>
-                                </p:cTn>
-                              </p:par>
-                            </p:childTnLst>
-                          </p:cTn>
-                        </p:par>
-                      </p:childTnLst>
-                    </p:cTn>
-                  </p:par>
-                  <p:par>
-                    <p:cTn id="11" fill="hold">
-                      <p:stCondLst>
-                        <p:cond delay="indefinite"/>
-                      </p:stCondLst>
-                      <p:childTnLst>
-                        <p:par>
-                          <p:cTn id="12" fill="hold">
-                            <p:stCondLst>
-                              <p:cond delay="0"/>
-                            </p:stCondLst>
-                            <p:childTnLst>
-                              <p:par>
-                                <p:cTn id="13" presetID="1" presetClass="entr" presetSubtype="0" fill="hold" grpId="0" nodeType="clickEffect">
-                                  <p:stCondLst>
-                                    <p:cond delay="0"/>
-                                  </p:stCondLst>
-                                  <p:childTnLst>
-                                    <p:set>
-                                      <p:cBhvr>
-                                        <p:cTn id="14" dur="1" fill="hold">
-                                          <p:stCondLst>
-                                            <p:cond delay="0"/>
-                                          </p:stCondLst>
-                                        </p:cTn>
-                                        <p:tgtEl>
-                                          <p:spTgt spid="7"/>
-                                        </p:tgtEl>
-                                        <p:attrNameLst>
-                                          <p:attrName>style.visibility</p:attrName>
-                                        </p:attrNameLst>
-                                      </p:cBhvr>
-                                      <p:to>
-                                        <p:strVal val="visible"/>
-                                      </p:to>
-                                    </p:set>
-                                  </p:childTnLst>
-                                </p:cTn>
-                              </p:par>
-                            </p:childTnLst>
-                          </p:cTn>
-                        </p:par>
-                      </p:childTnLst>
-                    </p:cTn>
-                  </p:par>
-                  <p:par>
-                    <p:cTn id="15" fill="hold">
-                      <p:stCondLst>
-                        <p:cond delay="indefinite"/>
-                      </p:stCondLst>
-                      <p:childTnLst>
-                        <p:par>
-                          <p:cTn id="16" fill="hold">
-                            <p:stCondLst>
-                              <p:cond delay="0"/>
-                            </p:stCondLst>
-                            <p:childTnLst>
-                              <p:par>
-                                <p:cTn id="17" presetID="1" presetClass="entr" presetSubtype="0" fill="hold" grpId="0" nodeType="clickEffect">
-                                  <p:stCondLst>
-                                    <p:cond delay="0"/>
-                                  </p:stCondLst>
-                                  <p:childTnLst>
-                                    <p:set>
-                                      <p:cBhvr>
-                                        <p:cTn id="18" dur="1" fill="hold">
-                                          <p:stCondLst>
-                                            <p:cond delay="0"/>
-                                          </p:stCondLst>
-                                        </p:cTn>
-                                        <p:tgtEl>
-                                          <p:spTgt spid="8"/>
-                                        </p:tgtEl>
-                                        <p:attrNameLst>
-                                          <p:attrName>style.visibility</p:attrName>
-                                        </p:attrNameLst>
-                                      </p:cBhvr>
-                                      <p:to>
-                                        <p:strVal val="visible"/>
-                                      </p:to>
-                                    </p:set>
-                                  </p:childTnLst>
-                                </p:cTn>
-                              </p:par>
-                            </p:childTnLst>
-                          </p:cTn>
-                        </p:par>
-                      </p:childTnLst>
-                    </p:cTn>
-                  </p:par>
-                  <p:par>
-                    <p:cTn id="19" fill="hold">
-                      <p:stCondLst>
-                        <p:cond delay="indefinite"/>
-                      </p:stCondLst>
-                      <p:childTnLst>
-                        <p:par>
-                          <p:cTn id="20" fill="hold">
-                            <p:stCondLst>
-                              <p:cond delay="0"/>
-                            </p:stCondLst>
-                            <p:childTnLst>
-                              <p:par>
-                                <p:cTn id="21" presetID="1" presetClass="entr" presetSubtype="0" fill="hold" grpId="0" nodeType="clickEffect">
-                                  <p:stCondLst>
-                                    <p:cond delay="0"/>
-                                  </p:stCondLst>
-                                  <p:childTnLst>
-                                    <p:set>
-                                      <p:cBhvr>
-                                        <p:cTn id="22" dur="1" fill="hold">
-                                          <p:stCondLst>
-                                            <p:cond delay="0"/>
-                                          </p:stCondLst>
-                                        </p:cTn>
-                                        <p:tgtEl>
-                                          <p:spTgt spid="9"/>
-                                        </p:tgtEl>
-                                        <p:attrNameLst>
-                                          <p:attrName>style.visibility</p:attrName>
-                                        </p:attrNameLst>
-                                      </p:cBhvr>
-                                      <p:to>
-                                        <p:strVal val="visible"/>
-                                      </p:to>
-                                    </p:set>
-                                  </p:childTnLst>
-                                </p:cTn>
-                              </p:par>
-                            </p:childTnLst>
-                          </p:cTn>
-                        </p:par>
-                      </p:childTnLst>
-                    </p:cTn>
-                  </p:par>
-                </p:childTnLst>
-              </p:cTn>
-              <p:prevCondLst>
-                <p:cond evt="onPrev" delay="0">
-                  <p:tgtEl>
-                    <p:sldTgt/>
-                  </p:tgtEl>
-                </p:cond>
-              </p:prevCondLst>
-              <p:nextCondLst>
-                <p:cond evt="onNext" delay="0">
-                  <p:tgtEl>
-                    <p:sldTgt/>
-                  </p:tgtEl>
-                </p:cond>
-              </p:nextCondLst>
-            </p:seq>
-          </p:childTnLst>
-        </p:cTn>
-      </p:par>
-    </p:tnLst>
-    <p:bldLst>
-      <p:bldP spid="4" grpId="0"/>
-      <p:bldP spid="6" grpId="0"/>
-      <p:bldP spid="7" grpId="0"/>
-      <p:bldP spid="8" grpId="0"/>
-      <p:bldP spid="9" grpId="0"/>
-    </p:bldLst>
-  </p:timing>
-</p:sld>
-</file>
-
-<file path=ppt/slides/slide8.xml><?xml version="1.0" encoding="utf-8"?>
-<p:sld xmlns:a="http://schemas.openxmlformats.org/drawingml/2006/main" xmlns:r="http://schemas.openxmlformats.org/officeDocument/2006/relationships" xmlns:p="http://schemas.openxmlformats.org/presentationml/2006/main">
-  <p:cSld>
-    <p:spTree>
-      <p:nvGrpSpPr>
-        <p:cNvPr id="1" name=""/>
-        <p:cNvGrpSpPr/>
-        <p:nvPr/>
-      </p:nvGrpSpPr>
-      <p:grpSpPr>
-        <a:xfrm>
-          <a:off x="0" y="0"/>
-          <a:ext cx="0" cy="0"/>
-          <a:chOff x="0" y="0"/>
-          <a:chExt cx="0" cy="0"/>
-        </a:xfrm>
-      </p:grpSpPr>
-      <p:sp>
-        <p:nvSpPr>
-          <p:cNvPr id="2" name="Inhaltsplatzhalter 1"/>
-          <p:cNvSpPr>
-            <a:spLocks noGrp="1"/>
-          </p:cNvSpPr>
-          <p:nvPr>
-            <p:ph sz="half" idx="1"/>
-          </p:nvPr>
-        </p:nvSpPr>
-        <p:spPr/>
-        <p:txBody>
-          <a:bodyPr/>
-          <a:lstStyle/>
-          <a:p>
-            <a:r>
-              <a:rPr lang="de-CH" dirty="0" err="1" smtClean="0"/>
-              <a:t>Prefab</a:t>
-            </a:r>
-            <a:r>
-              <a:rPr lang="de-CH" dirty="0" smtClean="0"/>
-              <a:t> (</a:t>
-            </a:r>
-            <a:r>
-              <a:rPr lang="de-CH" dirty="0" err="1" smtClean="0"/>
-              <a:t>Rigidbody</a:t>
-            </a:r>
-            <a:r>
-              <a:rPr lang="de-CH" dirty="0" smtClean="0"/>
-              <a:t>) instanziieren</a:t>
-            </a:r>
-          </a:p>
-          <a:p>
-            <a:r>
-              <a:rPr lang="de-CH" dirty="0" smtClean="0"/>
-              <a:t>Position von </a:t>
-            </a:r>
-            <a:r>
-              <a:rPr lang="de-CH" dirty="0" err="1" smtClean="0"/>
-              <a:t>Turret</a:t>
-            </a:r>
-            <a:r>
-              <a:rPr lang="de-CH" dirty="0" smtClean="0"/>
-              <a:t> übernehmen</a:t>
-            </a:r>
-          </a:p>
-          <a:p>
-            <a:r>
-              <a:rPr lang="de-CH" dirty="0" smtClean="0"/>
-              <a:t>Force hinzufügen</a:t>
-            </a:r>
-          </a:p>
-          <a:p>
-            <a:r>
-              <a:rPr lang="de-CH" dirty="0" smtClean="0"/>
-              <a:t>Sound abspielen</a:t>
-            </a:r>
-          </a:p>
-          <a:p>
-            <a:r>
-              <a:rPr lang="de-CH" dirty="0" smtClean="0"/>
-              <a:t>Nach Timeout </a:t>
-            </a:r>
-            <a:r>
-              <a:rPr lang="de-CH" dirty="0" err="1" smtClean="0"/>
-              <a:t>GameObject</a:t>
-            </a:r>
-            <a:r>
-              <a:rPr lang="de-CH" dirty="0" smtClean="0"/>
-              <a:t> zerstören</a:t>
-            </a:r>
-          </a:p>
-          <a:p>
-            <a:pPr lvl="1"/>
-            <a:endParaRPr lang="de-CH" dirty="0"/>
-          </a:p>
-          <a:p>
-            <a:endParaRPr lang="de-CH" dirty="0" smtClean="0"/>
-          </a:p>
-          <a:p>
-            <a:endParaRPr lang="de-CH" dirty="0"/>
-          </a:p>
-          <a:p>
-            <a:endParaRPr lang="de-CH" dirty="0" smtClean="0"/>
-          </a:p>
-          <a:p>
-            <a:pPr marL="457200" lvl="1" indent="0">
-              <a:buNone/>
-            </a:pPr>
-            <a:endParaRPr lang="de-CH" dirty="0" smtClean="0"/>
-          </a:p>
-          <a:p>
-            <a:endParaRPr lang="de-CH" dirty="0" smtClean="0"/>
-          </a:p>
-          <a:p>
-            <a:endParaRPr lang="de-CH" dirty="0"/>
-          </a:p>
-        </p:txBody>
-      </p:sp>
-      <p:sp>
-        <p:nvSpPr>
-          <p:cNvPr id="3" name="Titel 2"/>
-          <p:cNvSpPr>
-            <a:spLocks noGrp="1"/>
-          </p:cNvSpPr>
-          <p:nvPr>
-            <p:ph type="ctrTitle"/>
-          </p:nvPr>
-        </p:nvSpPr>
-        <p:spPr/>
-        <p:txBody>
-          <a:bodyPr/>
-          <a:lstStyle/>
-          <a:p>
-            <a:r>
-              <a:rPr lang="de-CH" dirty="0" err="1" smtClean="0"/>
-              <a:t>Rockets</a:t>
-            </a:r>
-            <a:endParaRPr lang="de-CH" dirty="0"/>
-          </a:p>
-        </p:txBody>
-      </p:sp>
-      <p:pic>
-        <p:nvPicPr>
-          <p:cNvPr id="5" name="Grafik 4"/>
-          <p:cNvPicPr>
-            <a:picLocks noChangeAspect="1"/>
-          </p:cNvPicPr>
-          <p:nvPr/>
-        </p:nvPicPr>
-        <p:blipFill>
-          <a:blip r:embed="rId2">
-            <a:extLst>
-              <a:ext uri="{28A0092B-C50C-407E-A947-70E740481C1C}">
-                <a14:useLocalDpi xmlns:a14="http://schemas.microsoft.com/office/drawing/2010/main" val="0"/>
-              </a:ext>
-            </a:extLst>
-          </a:blip>
-          <a:stretch>
-            <a:fillRect/>
-          </a:stretch>
-        </p:blipFill>
-        <p:spPr>
-          <a:xfrm>
-            <a:off x="6087118" y="560512"/>
-            <a:ext cx="2041539" cy="1758973"/>
-          </a:xfrm>
-          <a:prstGeom prst="rect">
-            <a:avLst/>
-          </a:prstGeom>
-        </p:spPr>
-      </p:pic>
-    </p:spTree>
-    <p:extLst>
-      <p:ext uri="{BB962C8B-B14F-4D97-AF65-F5344CB8AC3E}">
-        <p14:creationId xmlns:p14="http://schemas.microsoft.com/office/powerpoint/2010/main" val="4210151505"/>
-      </p:ext>
-    </p:extLst>
-  </p:cSld>
-  <p:clrMapOvr>
-    <a:masterClrMapping/>
-  </p:clrMapOvr>
-  <p:timing>
-    <p:tnLst>
-      <p:par>
-        <p:cTn id="1" dur="indefinite" restart="never" nodeType="tmRoot"/>
-      </p:par>
-    </p:tnLst>
-  </p:timing>
-</p:sld>
-</file>
-
 <file path=ppt/slides/slide9.xml><?xml version="1.0" encoding="utf-8"?>
 <p:sld xmlns:a="http://schemas.openxmlformats.org/drawingml/2006/main" xmlns:r="http://schemas.openxmlformats.org/officeDocument/2006/relationships" xmlns:p="http://schemas.openxmlformats.org/presentationml/2006/main">
   <p:cSld>
@@ -9766,40 +9357,97 @@
           <a:p>
             <a:r>
               <a:rPr lang="de-CH" dirty="0" smtClean="0"/>
-              <a:t>Gleichzeitig Explosion (Partikelsystem) instanziieren</a:t>
+              <a:t>Punkte, Zeit </a:t>
+            </a:r>
+          </a:p>
+          <a:p>
+            <a:endParaRPr lang="de-CH" dirty="0" smtClean="0"/>
+          </a:p>
+          <a:p>
+            <a:r>
+              <a:rPr lang="de-CH" dirty="0" err="1" smtClean="0"/>
+              <a:t>Crosshair</a:t>
+            </a:r>
+            <a:endParaRPr lang="de-CH" dirty="0" smtClean="0"/>
+          </a:p>
+          <a:p>
+            <a:pPr lvl="1"/>
+            <a:r>
+              <a:rPr lang="de-CH" dirty="0" err="1" smtClean="0"/>
+              <a:t>Scrollbar</a:t>
             </a:r>
             <a:endParaRPr lang="de-CH" dirty="0"/>
           </a:p>
           <a:p>
-            <a:r>
-              <a:rPr lang="de-CH" dirty="0"/>
-              <a:t>Zufälliger Sound </a:t>
-            </a:r>
+            <a:pPr lvl="1"/>
             <a:r>
               <a:rPr lang="de-CH" dirty="0" smtClean="0"/>
-              <a:t>abspielen</a:t>
-            </a:r>
-          </a:p>
-          <a:p>
-            <a:r>
-              <a:rPr lang="de-CH" dirty="0" err="1" smtClean="0"/>
-              <a:t>ExplosionForce</a:t>
-            </a:r>
-            <a:r>
-              <a:rPr lang="de-CH" dirty="0" smtClean="0"/>
-              <a:t> für nahe </a:t>
-            </a:r>
-            <a:r>
-              <a:rPr lang="de-CH" dirty="0" err="1" smtClean="0"/>
-              <a:t>Rigidbodies</a:t>
-            </a:r>
+              <a:t>Sprites</a:t>
+            </a:r>
+          </a:p>
+          <a:p>
+            <a:pPr lvl="1"/>
             <a:endParaRPr lang="de-CH" dirty="0" smtClean="0"/>
           </a:p>
           <a:p>
+            <a:pPr lvl="1"/>
             <a:endParaRPr lang="de-CH" dirty="0"/>
           </a:p>
           <a:p>
-            <a:endParaRPr lang="en-US" dirty="0"/>
+            <a:pPr lvl="1">
+              <a:buFont typeface="Wingdings" panose="05000000000000000000" pitchFamily="2" charset="2"/>
+              <a:buChar char="à"/>
+            </a:pPr>
+            <a:r>
+              <a:rPr lang="de-CH" dirty="0" smtClean="0">
+                <a:sym typeface="Wingdings" panose="05000000000000000000" pitchFamily="2" charset="2"/>
+              </a:rPr>
+              <a:t>«</a:t>
+            </a:r>
+            <a:r>
+              <a:rPr lang="de-CH" dirty="0" err="1" smtClean="0">
+                <a:sym typeface="Wingdings" panose="05000000000000000000" pitchFamily="2" charset="2"/>
+              </a:rPr>
+              <a:t>onGUI</a:t>
+            </a:r>
+            <a:r>
+              <a:rPr lang="de-CH" dirty="0" smtClean="0">
+                <a:sym typeface="Wingdings" panose="05000000000000000000" pitchFamily="2" charset="2"/>
+              </a:rPr>
+              <a:t>» Funktion mit </a:t>
+            </a:r>
+            <a:r>
+              <a:rPr lang="de-CH" dirty="0" err="1" smtClean="0">
+                <a:sym typeface="Wingdings" panose="05000000000000000000" pitchFamily="2" charset="2"/>
+              </a:rPr>
+              <a:t>DrawTexture</a:t>
+            </a:r>
+            <a:endParaRPr lang="de-CH" dirty="0" smtClean="0">
+              <a:sym typeface="Wingdings" panose="05000000000000000000" pitchFamily="2" charset="2"/>
+            </a:endParaRPr>
+          </a:p>
+          <a:p>
+            <a:pPr lvl="1">
+              <a:buFont typeface="Wingdings" panose="05000000000000000000" pitchFamily="2" charset="2"/>
+              <a:buChar char="à"/>
+            </a:pPr>
+            <a:endParaRPr lang="de-CH" dirty="0">
+              <a:sym typeface="Wingdings" panose="05000000000000000000" pitchFamily="2" charset="2"/>
+            </a:endParaRPr>
+          </a:p>
+          <a:p>
+            <a:pPr lvl="1">
+              <a:buFont typeface="Wingdings" panose="05000000000000000000" pitchFamily="2" charset="2"/>
+              <a:buChar char="à"/>
+            </a:pPr>
+            <a:endParaRPr lang="de-CH" dirty="0" smtClean="0"/>
+          </a:p>
+          <a:p>
+            <a:endParaRPr lang="de-CH" dirty="0"/>
+          </a:p>
+          <a:p>
+            <a:pPr lvl="1"/>
+            <a:endParaRPr lang="de-CH" dirty="0"/>
           </a:p>
         </p:txBody>
       </p:sp>
@@ -9819,47 +9467,17 @@
           <a:lstStyle/>
           <a:p>
             <a:r>
-              <a:rPr lang="de-CH" dirty="0" err="1" smtClean="0"/>
-              <a:t>Rockets</a:t>
-            </a:r>
-            <a:endParaRPr lang="en-US" dirty="0"/>
-          </a:p>
-        </p:txBody>
-      </p:sp>
-      <p:pic>
-        <p:nvPicPr>
-          <p:cNvPr id="4" name="Grafik 3"/>
-          <p:cNvPicPr>
-            <a:picLocks noChangeAspect="1"/>
-          </p:cNvPicPr>
-          <p:nvPr/>
-        </p:nvPicPr>
-        <p:blipFill>
-          <a:blip r:embed="rId3">
-            <a:extLst>
-              <a:ext uri="{28A0092B-C50C-407E-A947-70E740481C1C}">
-                <a14:useLocalDpi xmlns:a14="http://schemas.microsoft.com/office/drawing/2010/main" val="0"/>
-              </a:ext>
-            </a:extLst>
-          </a:blip>
-          <a:stretch>
-            <a:fillRect/>
-          </a:stretch>
-        </p:blipFill>
-        <p:spPr>
-          <a:xfrm>
-            <a:off x="797513" y="3678862"/>
-            <a:ext cx="3395546" cy="2017280"/>
-          </a:xfrm>
-          <a:prstGeom prst="rect">
-            <a:avLst/>
-          </a:prstGeom>
-        </p:spPr>
-      </p:pic>
+              <a:rPr lang="de-CH" dirty="0" smtClean="0"/>
+              <a:t>GUI</a:t>
+            </a:r>
+            <a:endParaRPr lang="de-CH" dirty="0"/>
+          </a:p>
+        </p:txBody>
+      </p:sp>
     </p:spTree>
     <p:extLst>
       <p:ext uri="{BB962C8B-B14F-4D97-AF65-F5344CB8AC3E}">
-        <p14:creationId xmlns:p14="http://schemas.microsoft.com/office/powerpoint/2010/main" val="1597542597"/>
+        <p14:creationId xmlns:p14="http://schemas.microsoft.com/office/powerpoint/2010/main" val="2202351975"/>
       </p:ext>
     </p:extLst>
   </p:cSld>
@@ -10707,6 +10325,31 @@
 </file>
 
 <file path=customXml/item1.xml><?xml version="1.0" encoding="utf-8"?>
+<p:properties xmlns:p="http://schemas.microsoft.com/office/2006/metadata/properties" xmlns:xsi="http://www.w3.org/2001/XMLSchema-instance" xmlns:pc="http://schemas.microsoft.com/office/infopath/2007/PartnerControls">
+  <documentManagement>
+    <BfhIntranetDepartmentText xmlns="63c724b1-652e-424f-8d99-4ee509067280">
+      <Terms xmlns="http://schemas.microsoft.com/office/infopath/2007/PartnerControls">
+        <TermInfo xmlns="http://schemas.microsoft.com/office/infopath/2007/PartnerControls">
+          <TermName xmlns="http://schemas.microsoft.com/office/infopath/2007/PartnerControls">Vorlage</TermName>
+          <TermId xmlns="http://schemas.microsoft.com/office/infopath/2007/PartnerControls">de1a6d3c-ac6a-4b34-8edd-308eb81066db</TermId>
+        </TermInfo>
+      </Terms>
+    </BfhIntranetDepartmentText>
+    <QMPilot_DokID xmlns="2551ef7e-3b29-44d1-a8ad-ef34c26bfc60">469</QMPilot_DokID>
+  </documentManagement>
+</p:properties>
+</file>
+
+<file path=customXml/item2.xml><?xml version="1.0" encoding="utf-8"?>
+<?mso-contentType ?>
+<FormTemplates xmlns="http://schemas.microsoft.com/sharepoint/v3/contenttype/forms">
+  <Display>DocumentLibraryForm</Display>
+  <Edit>DocumentLibraryForm</Edit>
+  <New>DocumentLibraryForm</New>
+</FormTemplates>
+</file>
+
+<file path=customXml/item3.xml><?xml version="1.0" encoding="utf-8"?>
 <ct:contentTypeSchema xmlns:ct="http://schemas.microsoft.com/office/2006/metadata/contentType" xmlns:ma="http://schemas.microsoft.com/office/2006/metadata/properties/metaAttributes" ct:_="" ma:_="" ma:contentTypeName="QMPilot_ContentType" ma:contentTypeID="0x0101009127C3B567804923A8661E062BBD8EF500AB8983C84EF542A7976DC8547A5CDC52001BD440F45714504284DA526949208683" ma:contentTypeVersion="2" ma:contentTypeDescription="Create a new document." ma:contentTypeScope="" ma:versionID="706adce6add7c3bfcb673e0b11f1ed37">
   <xsd:schema xmlns:xsd="http://www.w3.org/2001/XMLSchema" xmlns:xs="http://www.w3.org/2001/XMLSchema" xmlns:p="http://schemas.microsoft.com/office/2006/metadata/properties" xmlns:ns2="63c724b1-652e-424f-8d99-4ee509067280" xmlns:ns3="2551ef7e-3b29-44d1-a8ad-ef34c26bfc60" targetNamespace="http://schemas.microsoft.com/office/2006/metadata/properties" ma:root="true" ma:fieldsID="0765d51910c97ab1de67628eb0dc66fa" ns2:_="" ns3:_="">
     <xsd:import namespace="63c724b1-652e-424f-8d99-4ee509067280"/>
@@ -10845,32 +10488,26 @@
 </ct:contentTypeSchema>
 </file>
 
-<file path=customXml/item2.xml><?xml version="1.0" encoding="utf-8"?>
-<?mso-contentType ?>
-<FormTemplates xmlns="http://schemas.microsoft.com/sharepoint/v3/contenttype/forms">
-  <Display>DocumentLibraryForm</Display>
-  <Edit>DocumentLibraryForm</Edit>
-  <New>DocumentLibraryForm</New>
-</FormTemplates>
+<file path=customXml/itemProps1.xml><?xml version="1.0" encoding="utf-8"?>
+<ds:datastoreItem xmlns:ds="http://schemas.openxmlformats.org/officeDocument/2006/customXml" ds:itemID="{96591048-6F15-48C6-9650-9BFF3E56974F}">
+  <ds:schemaRefs>
+    <ds:schemaRef ds:uri="http://schemas.microsoft.com/office/2006/metadata/properties"/>
+    <ds:schemaRef ds:uri="http://schemas.microsoft.com/office/infopath/2007/PartnerControls"/>
+    <ds:schemaRef ds:uri="63c724b1-652e-424f-8d99-4ee509067280"/>
+    <ds:schemaRef ds:uri="2551ef7e-3b29-44d1-a8ad-ef34c26bfc60"/>
+  </ds:schemaRefs>
+</ds:datastoreItem>
 </file>
 
-<file path=customXml/item3.xml><?xml version="1.0" encoding="utf-8"?>
-<p:properties xmlns:p="http://schemas.microsoft.com/office/2006/metadata/properties" xmlns:xsi="http://www.w3.org/2001/XMLSchema-instance" xmlns:pc="http://schemas.microsoft.com/office/infopath/2007/PartnerControls">
-  <documentManagement>
-    <BfhIntranetDepartmentText xmlns="63c724b1-652e-424f-8d99-4ee509067280">
-      <Terms xmlns="http://schemas.microsoft.com/office/infopath/2007/PartnerControls">
-        <TermInfo xmlns="http://schemas.microsoft.com/office/infopath/2007/PartnerControls">
-          <TermName xmlns="http://schemas.microsoft.com/office/infopath/2007/PartnerControls">Vorlage</TermName>
-          <TermId xmlns="http://schemas.microsoft.com/office/infopath/2007/PartnerControls">de1a6d3c-ac6a-4b34-8edd-308eb81066db</TermId>
-        </TermInfo>
-      </Terms>
-    </BfhIntranetDepartmentText>
-    <QMPilot_DokID xmlns="2551ef7e-3b29-44d1-a8ad-ef34c26bfc60">469</QMPilot_DokID>
-  </documentManagement>
-</p:properties>
+<file path=customXml/itemProps2.xml><?xml version="1.0" encoding="utf-8"?>
+<ds:datastoreItem xmlns:ds="http://schemas.openxmlformats.org/officeDocument/2006/customXml" ds:itemID="{CCF5E5E7-7F77-47A8-99A9-B4D5839292F3}">
+  <ds:schemaRefs>
+    <ds:schemaRef ds:uri="http://schemas.microsoft.com/sharepoint/v3/contenttype/forms"/>
+  </ds:schemaRefs>
+</ds:datastoreItem>
 </file>
 
-<file path=customXml/itemProps1.xml><?xml version="1.0" encoding="utf-8"?>
+<file path=customXml/itemProps3.xml><?xml version="1.0" encoding="utf-8"?>
 <ds:datastoreItem xmlns:ds="http://schemas.openxmlformats.org/officeDocument/2006/customXml" ds:itemID="{6A51C7F3-86FD-4A82-8259-3C4C8E258325}">
   <ds:schemaRefs>
     <ds:schemaRef ds:uri="http://schemas.microsoft.com/office/2006/metadata/contentType"/>
@@ -10887,23 +10524,4 @@
     <ds:schemaRef ds:uri="http://schemas.microsoft.com/internal/obd"/>
   </ds:schemaRefs>
 </ds:datastoreItem>
-</file>
-
-<file path=customXml/itemProps2.xml><?xml version="1.0" encoding="utf-8"?>
-<ds:datastoreItem xmlns:ds="http://schemas.openxmlformats.org/officeDocument/2006/customXml" ds:itemID="{CCF5E5E7-7F77-47A8-99A9-B4D5839292F3}">
-  <ds:schemaRefs>
-    <ds:schemaRef ds:uri="http://schemas.microsoft.com/sharepoint/v3/contenttype/forms"/>
-  </ds:schemaRefs>
-</ds:datastoreItem>
-</file>
-
-<file path=customXml/itemProps3.xml><?xml version="1.0" encoding="utf-8"?>
-<ds:datastoreItem xmlns:ds="http://schemas.openxmlformats.org/officeDocument/2006/customXml" ds:itemID="{96591048-6F15-48C6-9650-9BFF3E56974F}">
-  <ds:schemaRefs>
-    <ds:schemaRef ds:uri="http://schemas.microsoft.com/office/2006/metadata/properties"/>
-    <ds:schemaRef ds:uri="http://schemas.microsoft.com/office/infopath/2007/PartnerControls"/>
-    <ds:schemaRef ds:uri="63c724b1-652e-424f-8d99-4ee509067280"/>
-    <ds:schemaRef ds:uri="2551ef7e-3b29-44d1-a8ad-ef34c26bfc60"/>
-  </ds:schemaRefs>
-</ds:datastoreItem>
 </file>
</xml_diff>